<commit_message>
finish filtering of all benchmarks
</commit_message>
<xml_diff>
--- a/benchmark/benchmark.pptx
+++ b/benchmark/benchmark.pptx
@@ -5,14 +5,17 @@
     <p:sldMasterId id="2147483648" r:id="rId1"/>
   </p:sldMasterIdLst>
   <p:notesMasterIdLst>
-    <p:notesMasterId r:id="rId7"/>
+    <p:notesMasterId r:id="rId10"/>
   </p:notesMasterIdLst>
   <p:sldIdLst>
-    <p:sldId id="256" r:id="rId2"/>
-    <p:sldId id="258" r:id="rId3"/>
-    <p:sldId id="259" r:id="rId4"/>
+    <p:sldId id="259" r:id="rId2"/>
+    <p:sldId id="256" r:id="rId3"/>
+    <p:sldId id="258" r:id="rId4"/>
     <p:sldId id="260" r:id="rId5"/>
     <p:sldId id="261" r:id="rId6"/>
+    <p:sldId id="263" r:id="rId7"/>
+    <p:sldId id="264" r:id="rId8"/>
+    <p:sldId id="266" r:id="rId9"/>
   </p:sldIdLst>
   <p:sldSz cx="12192000" cy="6858000"/>
   <p:notesSz cx="6858000" cy="9144000"/>
@@ -111,6 +114,11 @@
       </a:defRPr>
     </a:lvl9pPr>
   </p:defaultTextStyle>
+  <p:extLst>
+    <p:ext uri="{EFAFB233-063F-42B5-8137-9DF3F51BA10A}">
+      <p15:sldGuideLst xmlns:p15="http://schemas.microsoft.com/office/powerpoint/2012/main"/>
+    </p:ext>
+  </p:extLst>
 </p:presentation>
 </file>
 
@@ -196,7 +204,7 @@
           <a:p>
             <a:fld id="{6E2EFCCA-1A1E-4A7E-BD68-8F3FE974EAAE}" type="datetimeFigureOut">
               <a:rPr lang="zh-CN" altLang="en-US" smtClean="0"/>
-              <a:t>2021/3/10</a:t>
+              <a:t>2021/3/11</a:t>
             </a:fld>
             <a:endParaRPr lang="zh-CN" altLang="en-US"/>
           </a:p>
@@ -967,6 +975,258 @@
 </p:notes>
 </file>
 
+<file path=ppt/notesSlides/notesSlide3.xml><?xml version="1.0" encoding="utf-8"?>
+<p:notes xmlns:a="http://schemas.openxmlformats.org/drawingml/2006/main" xmlns:r="http://schemas.openxmlformats.org/officeDocument/2006/relationships" xmlns:p="http://schemas.openxmlformats.org/presentationml/2006/main">
+  <p:cSld>
+    <p:spTree>
+      <p:nvGrpSpPr>
+        <p:cNvPr id="1" name=""/>
+        <p:cNvGrpSpPr/>
+        <p:nvPr/>
+      </p:nvGrpSpPr>
+      <p:grpSpPr>
+        <a:xfrm>
+          <a:off x="0" y="0"/>
+          <a:ext cx="0" cy="0"/>
+          <a:chOff x="0" y="0"/>
+          <a:chExt cx="0" cy="0"/>
+        </a:xfrm>
+      </p:grpSpPr>
+      <p:sp>
+        <p:nvSpPr>
+          <p:cNvPr id="2" name="幻灯片图像占位符 1"/>
+          <p:cNvSpPr>
+            <a:spLocks noGrp="1" noRot="1" noChangeAspect="1"/>
+          </p:cNvSpPr>
+          <p:nvPr>
+            <p:ph type="sldImg"/>
+          </p:nvPr>
+        </p:nvSpPr>
+        <p:spPr/>
+      </p:sp>
+      <p:sp>
+        <p:nvSpPr>
+          <p:cNvPr id="3" name="备注占位符 2"/>
+          <p:cNvSpPr>
+            <a:spLocks noGrp="1"/>
+          </p:cNvSpPr>
+          <p:nvPr>
+            <p:ph type="body" idx="1"/>
+          </p:nvPr>
+        </p:nvSpPr>
+        <p:spPr/>
+        <p:txBody>
+          <a:bodyPr/>
+          <a:lstStyle/>
+          <a:p>
+            <a:endParaRPr lang="zh-CN" altLang="en-US" dirty="0"/>
+          </a:p>
+        </p:txBody>
+      </p:sp>
+      <p:sp>
+        <p:nvSpPr>
+          <p:cNvPr id="4" name="灯片编号占位符 3"/>
+          <p:cNvSpPr>
+            <a:spLocks noGrp="1"/>
+          </p:cNvSpPr>
+          <p:nvPr>
+            <p:ph type="sldNum" sz="quarter" idx="5"/>
+          </p:nvPr>
+        </p:nvSpPr>
+        <p:spPr/>
+        <p:txBody>
+          <a:bodyPr/>
+          <a:lstStyle/>
+          <a:p>
+            <a:fld id="{0192149A-0B75-483C-90CD-E3C0A2838DD4}" type="slidenum">
+              <a:rPr lang="zh-CN" altLang="en-US" smtClean="0"/>
+              <a:t>6</a:t>
+            </a:fld>
+            <a:endParaRPr lang="zh-CN" altLang="en-US"/>
+          </a:p>
+        </p:txBody>
+      </p:sp>
+    </p:spTree>
+    <p:extLst>
+      <p:ext uri="{BB962C8B-B14F-4D97-AF65-F5344CB8AC3E}">
+        <p14:creationId xmlns:p14="http://schemas.microsoft.com/office/powerpoint/2010/main" val="792345844"/>
+      </p:ext>
+    </p:extLst>
+  </p:cSld>
+  <p:clrMapOvr>
+    <a:masterClrMapping/>
+  </p:clrMapOvr>
+</p:notes>
+</file>
+
+<file path=ppt/notesSlides/notesSlide4.xml><?xml version="1.0" encoding="utf-8"?>
+<p:notes xmlns:a="http://schemas.openxmlformats.org/drawingml/2006/main" xmlns:r="http://schemas.openxmlformats.org/officeDocument/2006/relationships" xmlns:p="http://schemas.openxmlformats.org/presentationml/2006/main">
+  <p:cSld>
+    <p:spTree>
+      <p:nvGrpSpPr>
+        <p:cNvPr id="1" name=""/>
+        <p:cNvGrpSpPr/>
+        <p:nvPr/>
+      </p:nvGrpSpPr>
+      <p:grpSpPr>
+        <a:xfrm>
+          <a:off x="0" y="0"/>
+          <a:ext cx="0" cy="0"/>
+          <a:chOff x="0" y="0"/>
+          <a:chExt cx="0" cy="0"/>
+        </a:xfrm>
+      </p:grpSpPr>
+      <p:sp>
+        <p:nvSpPr>
+          <p:cNvPr id="2" name="幻灯片图像占位符 1"/>
+          <p:cNvSpPr>
+            <a:spLocks noGrp="1" noRot="1" noChangeAspect="1"/>
+          </p:cNvSpPr>
+          <p:nvPr>
+            <p:ph type="sldImg"/>
+          </p:nvPr>
+        </p:nvSpPr>
+        <p:spPr/>
+      </p:sp>
+      <p:sp>
+        <p:nvSpPr>
+          <p:cNvPr id="3" name="备注占位符 2"/>
+          <p:cNvSpPr>
+            <a:spLocks noGrp="1"/>
+          </p:cNvSpPr>
+          <p:nvPr>
+            <p:ph type="body" idx="1"/>
+          </p:nvPr>
+        </p:nvSpPr>
+        <p:spPr/>
+        <p:txBody>
+          <a:bodyPr/>
+          <a:lstStyle/>
+          <a:p>
+            <a:endParaRPr lang="zh-CN" altLang="en-US" dirty="0"/>
+          </a:p>
+        </p:txBody>
+      </p:sp>
+      <p:sp>
+        <p:nvSpPr>
+          <p:cNvPr id="4" name="灯片编号占位符 3"/>
+          <p:cNvSpPr>
+            <a:spLocks noGrp="1"/>
+          </p:cNvSpPr>
+          <p:nvPr>
+            <p:ph type="sldNum" sz="quarter" idx="5"/>
+          </p:nvPr>
+        </p:nvSpPr>
+        <p:spPr/>
+        <p:txBody>
+          <a:bodyPr/>
+          <a:lstStyle/>
+          <a:p>
+            <a:fld id="{0192149A-0B75-483C-90CD-E3C0A2838DD4}" type="slidenum">
+              <a:rPr lang="zh-CN" altLang="en-US" smtClean="0"/>
+              <a:t>7</a:t>
+            </a:fld>
+            <a:endParaRPr lang="zh-CN" altLang="en-US"/>
+          </a:p>
+        </p:txBody>
+      </p:sp>
+    </p:spTree>
+    <p:extLst>
+      <p:ext uri="{BB962C8B-B14F-4D97-AF65-F5344CB8AC3E}">
+        <p14:creationId xmlns:p14="http://schemas.microsoft.com/office/powerpoint/2010/main" val="1944207464"/>
+      </p:ext>
+    </p:extLst>
+  </p:cSld>
+  <p:clrMapOvr>
+    <a:masterClrMapping/>
+  </p:clrMapOvr>
+</p:notes>
+</file>
+
+<file path=ppt/notesSlides/notesSlide5.xml><?xml version="1.0" encoding="utf-8"?>
+<p:notes xmlns:a="http://schemas.openxmlformats.org/drawingml/2006/main" xmlns:r="http://schemas.openxmlformats.org/officeDocument/2006/relationships" xmlns:p="http://schemas.openxmlformats.org/presentationml/2006/main">
+  <p:cSld>
+    <p:spTree>
+      <p:nvGrpSpPr>
+        <p:cNvPr id="1" name=""/>
+        <p:cNvGrpSpPr/>
+        <p:nvPr/>
+      </p:nvGrpSpPr>
+      <p:grpSpPr>
+        <a:xfrm>
+          <a:off x="0" y="0"/>
+          <a:ext cx="0" cy="0"/>
+          <a:chOff x="0" y="0"/>
+          <a:chExt cx="0" cy="0"/>
+        </a:xfrm>
+      </p:grpSpPr>
+      <p:sp>
+        <p:nvSpPr>
+          <p:cNvPr id="2" name="幻灯片图像占位符 1"/>
+          <p:cNvSpPr>
+            <a:spLocks noGrp="1" noRot="1" noChangeAspect="1"/>
+          </p:cNvSpPr>
+          <p:nvPr>
+            <p:ph type="sldImg"/>
+          </p:nvPr>
+        </p:nvSpPr>
+        <p:spPr/>
+      </p:sp>
+      <p:sp>
+        <p:nvSpPr>
+          <p:cNvPr id="3" name="备注占位符 2"/>
+          <p:cNvSpPr>
+            <a:spLocks noGrp="1"/>
+          </p:cNvSpPr>
+          <p:nvPr>
+            <p:ph type="body" idx="1"/>
+          </p:nvPr>
+        </p:nvSpPr>
+        <p:spPr/>
+        <p:txBody>
+          <a:bodyPr/>
+          <a:lstStyle/>
+          <a:p>
+            <a:endParaRPr lang="zh-CN" altLang="en-US" dirty="0"/>
+          </a:p>
+        </p:txBody>
+      </p:sp>
+      <p:sp>
+        <p:nvSpPr>
+          <p:cNvPr id="4" name="灯片编号占位符 3"/>
+          <p:cNvSpPr>
+            <a:spLocks noGrp="1"/>
+          </p:cNvSpPr>
+          <p:nvPr>
+            <p:ph type="sldNum" sz="quarter" idx="5"/>
+          </p:nvPr>
+        </p:nvSpPr>
+        <p:spPr/>
+        <p:txBody>
+          <a:bodyPr/>
+          <a:lstStyle/>
+          <a:p>
+            <a:fld id="{0192149A-0B75-483C-90CD-E3C0A2838DD4}" type="slidenum">
+              <a:rPr lang="zh-CN" altLang="en-US" smtClean="0"/>
+              <a:t>8</a:t>
+            </a:fld>
+            <a:endParaRPr lang="zh-CN" altLang="en-US"/>
+          </a:p>
+        </p:txBody>
+      </p:sp>
+    </p:spTree>
+    <p:extLst>
+      <p:ext uri="{BB962C8B-B14F-4D97-AF65-F5344CB8AC3E}">
+        <p14:creationId xmlns:p14="http://schemas.microsoft.com/office/powerpoint/2010/main" val="1046519098"/>
+      </p:ext>
+    </p:extLst>
+  </p:cSld>
+  <p:clrMapOvr>
+    <a:masterClrMapping/>
+  </p:clrMapOvr>
+</p:notes>
+</file>
+
 <file path=ppt/slideLayouts/slideLayout1.xml><?xml version="1.0" encoding="utf-8"?>
 <p:sldLayout xmlns:a="http://schemas.openxmlformats.org/drawingml/2006/main" xmlns:r="http://schemas.openxmlformats.org/officeDocument/2006/relationships" xmlns:p="http://schemas.openxmlformats.org/presentationml/2006/main" type="title" preserve="1">
   <p:cSld name="标题幻灯片">
@@ -1114,7 +1374,7 @@
           <a:p>
             <a:fld id="{79C4984E-2152-48AE-A290-9C70F3AFD632}" type="datetimeFigureOut">
               <a:rPr lang="zh-CN" altLang="en-US" smtClean="0"/>
-              <a:t>2021/3/10</a:t>
+              <a:t>2021/3/11</a:t>
             </a:fld>
             <a:endParaRPr lang="zh-CN" altLang="en-US"/>
           </a:p>
@@ -1312,7 +1572,7 @@
           <a:p>
             <a:fld id="{79C4984E-2152-48AE-A290-9C70F3AFD632}" type="datetimeFigureOut">
               <a:rPr lang="zh-CN" altLang="en-US" smtClean="0"/>
-              <a:t>2021/3/10</a:t>
+              <a:t>2021/3/11</a:t>
             </a:fld>
             <a:endParaRPr lang="zh-CN" altLang="en-US"/>
           </a:p>
@@ -1520,7 +1780,7 @@
           <a:p>
             <a:fld id="{79C4984E-2152-48AE-A290-9C70F3AFD632}" type="datetimeFigureOut">
               <a:rPr lang="zh-CN" altLang="en-US" smtClean="0"/>
-              <a:t>2021/3/10</a:t>
+              <a:t>2021/3/11</a:t>
             </a:fld>
             <a:endParaRPr lang="zh-CN" altLang="en-US"/>
           </a:p>
@@ -1718,7 +1978,7 @@
           <a:p>
             <a:fld id="{79C4984E-2152-48AE-A290-9C70F3AFD632}" type="datetimeFigureOut">
               <a:rPr lang="zh-CN" altLang="en-US" smtClean="0"/>
-              <a:t>2021/3/10</a:t>
+              <a:t>2021/3/11</a:t>
             </a:fld>
             <a:endParaRPr lang="zh-CN" altLang="en-US"/>
           </a:p>
@@ -1993,7 +2253,7 @@
           <a:p>
             <a:fld id="{79C4984E-2152-48AE-A290-9C70F3AFD632}" type="datetimeFigureOut">
               <a:rPr lang="zh-CN" altLang="en-US" smtClean="0"/>
-              <a:t>2021/3/10</a:t>
+              <a:t>2021/3/11</a:t>
             </a:fld>
             <a:endParaRPr lang="zh-CN" altLang="en-US"/>
           </a:p>
@@ -2258,7 +2518,7 @@
           <a:p>
             <a:fld id="{79C4984E-2152-48AE-A290-9C70F3AFD632}" type="datetimeFigureOut">
               <a:rPr lang="zh-CN" altLang="en-US" smtClean="0"/>
-              <a:t>2021/3/10</a:t>
+              <a:t>2021/3/11</a:t>
             </a:fld>
             <a:endParaRPr lang="zh-CN" altLang="en-US"/>
           </a:p>
@@ -2670,7 +2930,7 @@
           <a:p>
             <a:fld id="{79C4984E-2152-48AE-A290-9C70F3AFD632}" type="datetimeFigureOut">
               <a:rPr lang="zh-CN" altLang="en-US" smtClean="0"/>
-              <a:t>2021/3/10</a:t>
+              <a:t>2021/3/11</a:t>
             </a:fld>
             <a:endParaRPr lang="zh-CN" altLang="en-US"/>
           </a:p>
@@ -2811,7 +3071,7 @@
           <a:p>
             <a:fld id="{79C4984E-2152-48AE-A290-9C70F3AFD632}" type="datetimeFigureOut">
               <a:rPr lang="zh-CN" altLang="en-US" smtClean="0"/>
-              <a:t>2021/3/10</a:t>
+              <a:t>2021/3/11</a:t>
             </a:fld>
             <a:endParaRPr lang="zh-CN" altLang="en-US"/>
           </a:p>
@@ -2924,7 +3184,7 @@
           <a:p>
             <a:fld id="{79C4984E-2152-48AE-A290-9C70F3AFD632}" type="datetimeFigureOut">
               <a:rPr lang="zh-CN" altLang="en-US" smtClean="0"/>
-              <a:t>2021/3/10</a:t>
+              <a:t>2021/3/11</a:t>
             </a:fld>
             <a:endParaRPr lang="zh-CN" altLang="en-US"/>
           </a:p>
@@ -3235,7 +3495,7 @@
           <a:p>
             <a:fld id="{79C4984E-2152-48AE-A290-9C70F3AFD632}" type="datetimeFigureOut">
               <a:rPr lang="zh-CN" altLang="en-US" smtClean="0"/>
-              <a:t>2021/3/10</a:t>
+              <a:t>2021/3/11</a:t>
             </a:fld>
             <a:endParaRPr lang="zh-CN" altLang="en-US"/>
           </a:p>
@@ -3523,7 +3783,7 @@
           <a:p>
             <a:fld id="{79C4984E-2152-48AE-A290-9C70F3AFD632}" type="datetimeFigureOut">
               <a:rPr lang="zh-CN" altLang="en-US" smtClean="0"/>
-              <a:t>2021/3/10</a:t>
+              <a:t>2021/3/11</a:t>
             </a:fld>
             <a:endParaRPr lang="zh-CN" altLang="en-US"/>
           </a:p>
@@ -3764,7 +4024,7 @@
           <a:p>
             <a:fld id="{79C4984E-2152-48AE-A290-9C70F3AFD632}" type="datetimeFigureOut">
               <a:rPr lang="zh-CN" altLang="en-US" smtClean="0"/>
-              <a:t>2021/3/10</a:t>
+              <a:t>2021/3/11</a:t>
             </a:fld>
             <a:endParaRPr lang="zh-CN" altLang="en-US"/>
           </a:p>
@@ -4196,6 +4456,422 @@
           <p:nvPr>
             <p:extLst>
               <p:ext uri="{D42A27DB-BD31-4B8C-83A1-F6EECF244321}">
+                <p14:modId xmlns:p14="http://schemas.microsoft.com/office/powerpoint/2010/main" val="2486167403"/>
+              </p:ext>
+            </p:extLst>
+          </p:nvPr>
+        </p:nvGraphicFramePr>
+        <p:xfrm>
+          <a:off x="2445079" y="757460"/>
+          <a:ext cx="7301838" cy="741680"/>
+        </p:xfrm>
+        <a:graphic>
+          <a:graphicData uri="http://schemas.openxmlformats.org/drawingml/2006/table">
+            <a:tbl>
+              <a:tblPr firstRow="1" bandRow="1">
+                <a:tableStyleId>{C083E6E3-FA7D-4D7B-A595-EF9225AFEA82}</a:tableStyleId>
+              </a:tblPr>
+              <a:tblGrid>
+                <a:gridCol w="3240000">
+                  <a:extLst>
+                    <a:ext uri="{9D8B030D-6E8A-4147-A177-3AD203B41FA5}">
+                      <a16:colId xmlns:a16="http://schemas.microsoft.com/office/drawing/2014/main" val="1730557754"/>
+                    </a:ext>
+                  </a:extLst>
+                </a:gridCol>
+                <a:gridCol w="2029838">
+                  <a:extLst>
+                    <a:ext uri="{9D8B030D-6E8A-4147-A177-3AD203B41FA5}">
+                      <a16:colId xmlns:a16="http://schemas.microsoft.com/office/drawing/2014/main" val="1207819439"/>
+                    </a:ext>
+                  </a:extLst>
+                </a:gridCol>
+                <a:gridCol w="2032000">
+                  <a:extLst>
+                    <a:ext uri="{9D8B030D-6E8A-4147-A177-3AD203B41FA5}">
+                      <a16:colId xmlns:a16="http://schemas.microsoft.com/office/drawing/2014/main" val="3675628301"/>
+                    </a:ext>
+                  </a:extLst>
+                </a:gridCol>
+              </a:tblGrid>
+              <a:tr h="370840">
+                <a:tc>
+                  <a:txBody>
+                    <a:bodyPr/>
+                    <a:lstStyle/>
+                    <a:p>
+                      <a:r>
+                        <a:rPr lang="en-US" altLang="zh-CN" dirty="0">
+                          <a:latin typeface="Calibri" panose="020F0502020204030204" pitchFamily="34" charset="0"/>
+                          <a:cs typeface="Calibri" panose="020F0502020204030204" pitchFamily="34" charset="0"/>
+                        </a:rPr>
+                        <a:t>DOI</a:t>
+                      </a:r>
+                      <a:endParaRPr lang="zh-CN" altLang="en-US" dirty="0">
+                        <a:latin typeface="Calibri" panose="020F0502020204030204" pitchFamily="34" charset="0"/>
+                        <a:cs typeface="Calibri" panose="020F0502020204030204" pitchFamily="34" charset="0"/>
+                      </a:endParaRPr>
+                    </a:p>
+                  </a:txBody>
+                  <a:tcPr/>
+                </a:tc>
+                <a:tc>
+                  <a:txBody>
+                    <a:bodyPr/>
+                    <a:lstStyle/>
+                    <a:p>
+                      <a:r>
+                        <a:rPr lang="en-US" altLang="zh-CN" dirty="0">
+                          <a:latin typeface="Calibri" panose="020F0502020204030204" pitchFamily="34" charset="0"/>
+                          <a:cs typeface="Calibri" panose="020F0502020204030204" pitchFamily="34" charset="0"/>
+                        </a:rPr>
+                        <a:t>POI</a:t>
+                      </a:r>
+                      <a:endParaRPr lang="zh-CN" altLang="en-US" dirty="0">
+                        <a:latin typeface="Calibri" panose="020F0502020204030204" pitchFamily="34" charset="0"/>
+                        <a:cs typeface="Calibri" panose="020F0502020204030204" pitchFamily="34" charset="0"/>
+                      </a:endParaRPr>
+                    </a:p>
+                  </a:txBody>
+                  <a:tcPr/>
+                </a:tc>
+                <a:tc>
+                  <a:txBody>
+                    <a:bodyPr/>
+                    <a:lstStyle/>
+                    <a:p>
+                      <a:r>
+                        <a:rPr lang="en-US" altLang="zh-CN" dirty="0">
+                          <a:latin typeface="Calibri" panose="020F0502020204030204" pitchFamily="34" charset="0"/>
+                          <a:cs typeface="Calibri" panose="020F0502020204030204" pitchFamily="34" charset="0"/>
+                        </a:rPr>
+                        <a:t>RANK</a:t>
+                      </a:r>
+                      <a:endParaRPr lang="zh-CN" altLang="en-US" dirty="0">
+                        <a:latin typeface="Calibri" panose="020F0502020204030204" pitchFamily="34" charset="0"/>
+                        <a:cs typeface="Calibri" panose="020F0502020204030204" pitchFamily="34" charset="0"/>
+                      </a:endParaRPr>
+                    </a:p>
+                  </a:txBody>
+                  <a:tcPr/>
+                </a:tc>
+                <a:extLst>
+                  <a:ext uri="{0D108BD9-81ED-4DB2-BD59-A6C34878D82A}">
+                    <a16:rowId xmlns:a16="http://schemas.microsoft.com/office/drawing/2014/main" val="1875668321"/>
+                  </a:ext>
+                </a:extLst>
+              </a:tr>
+              <a:tr h="370840">
+                <a:tc>
+                  <a:txBody>
+                    <a:bodyPr/>
+                    <a:lstStyle/>
+                    <a:p>
+                      <a:r>
+                        <a:rPr lang="en-US" altLang="zh-CN" dirty="0">
+                          <a:latin typeface="Calibri" panose="020F0502020204030204" pitchFamily="34" charset="0"/>
+                          <a:cs typeface="Calibri" panose="020F0502020204030204" pitchFamily="34" charset="0"/>
+                        </a:rPr>
+                        <a:t>10.1371/journal.pone.0034354</a:t>
+                      </a:r>
+                      <a:endParaRPr lang="zh-CN" altLang="en-US" dirty="0">
+                        <a:latin typeface="Calibri" panose="020F0502020204030204" pitchFamily="34" charset="0"/>
+                        <a:cs typeface="Calibri" panose="020F0502020204030204" pitchFamily="34" charset="0"/>
+                      </a:endParaRPr>
+                    </a:p>
+                  </a:txBody>
+                  <a:tcPr/>
+                </a:tc>
+                <a:tc>
+                  <a:txBody>
+                    <a:bodyPr/>
+                    <a:lstStyle/>
+                    <a:p>
+                      <a:r>
+                        <a:rPr lang="el-GR" altLang="zh-CN" dirty="0">
+                          <a:latin typeface="Calibri" panose="020F0502020204030204" pitchFamily="34" charset="0"/>
+                          <a:cs typeface="Calibri" panose="020F0502020204030204" pitchFamily="34" charset="0"/>
+                        </a:rPr>
+                        <a:t>α-</a:t>
+                      </a:r>
+                      <a:r>
+                        <a:rPr lang="en-US" altLang="zh-CN" dirty="0">
+                          <a:latin typeface="Calibri" panose="020F0502020204030204" pitchFamily="34" charset="0"/>
+                          <a:cs typeface="Calibri" panose="020F0502020204030204" pitchFamily="34" charset="0"/>
+                        </a:rPr>
+                        <a:t>thrombin</a:t>
+                      </a:r>
+                      <a:endParaRPr lang="zh-CN" altLang="en-US" dirty="0">
+                        <a:latin typeface="Calibri" panose="020F0502020204030204" pitchFamily="34" charset="0"/>
+                        <a:cs typeface="Calibri" panose="020F0502020204030204" pitchFamily="34" charset="0"/>
+                      </a:endParaRPr>
+                    </a:p>
+                  </a:txBody>
+                  <a:tcPr/>
+                </a:tc>
+                <a:tc>
+                  <a:txBody>
+                    <a:bodyPr/>
+                    <a:lstStyle/>
+                    <a:p>
+                      <a:r>
+                        <a:rPr lang="en-US" altLang="zh-CN" dirty="0">
+                          <a:latin typeface="Calibri" panose="020F0502020204030204" pitchFamily="34" charset="0"/>
+                          <a:cs typeface="Calibri" panose="020F0502020204030204" pitchFamily="34" charset="0"/>
+                        </a:rPr>
+                        <a:t>5</a:t>
+                      </a:r>
+                      <a:endParaRPr lang="zh-CN" altLang="en-US" dirty="0">
+                        <a:latin typeface="Calibri" panose="020F0502020204030204" pitchFamily="34" charset="0"/>
+                        <a:cs typeface="Calibri" panose="020F0502020204030204" pitchFamily="34" charset="0"/>
+                      </a:endParaRPr>
+                    </a:p>
+                  </a:txBody>
+                  <a:tcPr/>
+                </a:tc>
+                <a:extLst>
+                  <a:ext uri="{0D108BD9-81ED-4DB2-BD59-A6C34878D82A}">
+                    <a16:rowId xmlns:a16="http://schemas.microsoft.com/office/drawing/2014/main" val="3942900020"/>
+                  </a:ext>
+                </a:extLst>
+              </a:tr>
+            </a:tbl>
+          </a:graphicData>
+        </a:graphic>
+      </p:graphicFrame>
+      <p:sp>
+        <p:nvSpPr>
+          <p:cNvPr id="13" name="文本框 12">
+            <a:extLst>
+              <a:ext uri="{FF2B5EF4-FFF2-40B4-BE49-F238E27FC236}">
+                <a16:creationId xmlns:a16="http://schemas.microsoft.com/office/drawing/2014/main" id="{1C430567-FB19-4B05-8A46-57292461E5E6}"/>
+              </a:ext>
+            </a:extLst>
+          </p:cNvPr>
+          <p:cNvSpPr txBox="1"/>
+          <p:nvPr/>
+        </p:nvSpPr>
+        <p:spPr>
+          <a:xfrm>
+            <a:off x="2258437" y="4900210"/>
+            <a:ext cx="7675125" cy="646331"/>
+          </a:xfrm>
+          <a:prstGeom prst="rect">
+            <a:avLst/>
+          </a:prstGeom>
+          <a:noFill/>
+        </p:spPr>
+        <p:txBody>
+          <a:bodyPr wrap="square" rtlCol="0">
+            <a:spAutoFit/>
+          </a:bodyPr>
+          <a:lstStyle/>
+          <a:p>
+            <a:r>
+              <a:rPr lang="en-US" altLang="zh-CN" dirty="0">
+                <a:latin typeface="Calibri" panose="020F0502020204030204" pitchFamily="34" charset="0"/>
+                <a:cs typeface="Calibri" panose="020F0502020204030204" pitchFamily="34" charset="0"/>
+              </a:rPr>
+              <a:t>Notes: </a:t>
+            </a:r>
+          </a:p>
+          <a:p>
+            <a:pPr marL="285750" indent="-285750">
+              <a:buFont typeface="Wingdings" panose="05000000000000000000" pitchFamily="2" charset="2"/>
+              <a:buChar char="ü"/>
+            </a:pPr>
+            <a:r>
+              <a:rPr lang="en-US" altLang="zh-CN" dirty="0">
+                <a:latin typeface="Calibri" panose="020F0502020204030204" pitchFamily="34" charset="0"/>
+                <a:cs typeface="Calibri" panose="020F0502020204030204" pitchFamily="34" charset="0"/>
+              </a:rPr>
+              <a:t>Containing D-type amino acids with thorough data</a:t>
+            </a:r>
+          </a:p>
+        </p:txBody>
+      </p:sp>
+      <p:pic>
+        <p:nvPicPr>
+          <p:cNvPr id="6" name="图片 5">
+            <a:extLst>
+              <a:ext uri="{FF2B5EF4-FFF2-40B4-BE49-F238E27FC236}">
+                <a16:creationId xmlns:a16="http://schemas.microsoft.com/office/drawing/2014/main" id="{55817B29-E010-4204-8AEC-C64D0D4D709C}"/>
+              </a:ext>
+            </a:extLst>
+          </p:cNvPr>
+          <p:cNvPicPr>
+            <a:picLocks noChangeAspect="1"/>
+          </p:cNvPicPr>
+          <p:nvPr/>
+        </p:nvPicPr>
+        <p:blipFill rotWithShape="1">
+          <a:blip r:embed="rId2"/>
+          <a:srcRect b="50000"/>
+          <a:stretch/>
+        </p:blipFill>
+        <p:spPr>
+          <a:xfrm>
+            <a:off x="4576415" y="1883911"/>
+            <a:ext cx="3520745" cy="3090178"/>
+          </a:xfrm>
+          <a:prstGeom prst="rect">
+            <a:avLst/>
+          </a:prstGeom>
+        </p:spPr>
+      </p:pic>
+      <p:pic>
+        <p:nvPicPr>
+          <p:cNvPr id="11" name="图片 10">
+            <a:extLst>
+              <a:ext uri="{FF2B5EF4-FFF2-40B4-BE49-F238E27FC236}">
+                <a16:creationId xmlns:a16="http://schemas.microsoft.com/office/drawing/2014/main" id="{68CD98A9-862F-4A36-BEA1-0987AFC735CC}"/>
+              </a:ext>
+            </a:extLst>
+          </p:cNvPr>
+          <p:cNvPicPr>
+            <a:picLocks noChangeAspect="1"/>
+          </p:cNvPicPr>
+          <p:nvPr/>
+        </p:nvPicPr>
+        <p:blipFill rotWithShape="1">
+          <a:blip r:embed="rId2"/>
+          <a:srcRect t="50000"/>
+          <a:stretch/>
+        </p:blipFill>
+        <p:spPr>
+          <a:xfrm>
+            <a:off x="8415002" y="1957790"/>
+            <a:ext cx="3520745" cy="3090178"/>
+          </a:xfrm>
+          <a:prstGeom prst="rect">
+            <a:avLst/>
+          </a:prstGeom>
+        </p:spPr>
+      </p:pic>
+      <p:grpSp>
+        <p:nvGrpSpPr>
+          <p:cNvPr id="8" name="组合 7">
+            <a:extLst>
+              <a:ext uri="{FF2B5EF4-FFF2-40B4-BE49-F238E27FC236}">
+                <a16:creationId xmlns:a16="http://schemas.microsoft.com/office/drawing/2014/main" id="{529D37E2-F279-4E5C-8A95-198EE940C1F8}"/>
+              </a:ext>
+            </a:extLst>
+          </p:cNvPr>
+          <p:cNvGrpSpPr/>
+          <p:nvPr/>
+        </p:nvGrpSpPr>
+        <p:grpSpPr>
+          <a:xfrm>
+            <a:off x="444972" y="1957790"/>
+            <a:ext cx="3813601" cy="2886974"/>
+            <a:chOff x="665093" y="1796950"/>
+            <a:chExt cx="3813601" cy="2886974"/>
+          </a:xfrm>
+        </p:grpSpPr>
+        <p:pic>
+          <p:nvPicPr>
+            <p:cNvPr id="3" name="图片 2">
+              <a:extLst>
+                <a:ext uri="{FF2B5EF4-FFF2-40B4-BE49-F238E27FC236}">
+                  <a16:creationId xmlns:a16="http://schemas.microsoft.com/office/drawing/2014/main" id="{C23358FE-10C4-4FC6-837D-5E6929EB2568}"/>
+                </a:ext>
+              </a:extLst>
+            </p:cNvPr>
+            <p:cNvPicPr>
+              <a:picLocks noChangeAspect="1"/>
+            </p:cNvPicPr>
+            <p:nvPr/>
+          </p:nvPicPr>
+          <p:blipFill rotWithShape="1">
+            <a:blip r:embed="rId3"/>
+            <a:srcRect l="1" r="32759"/>
+            <a:stretch/>
+          </p:blipFill>
+          <p:spPr>
+            <a:xfrm>
+              <a:off x="665093" y="1796950"/>
+              <a:ext cx="3813601" cy="1443487"/>
+            </a:xfrm>
+            <a:prstGeom prst="rect">
+              <a:avLst/>
+            </a:prstGeom>
+          </p:spPr>
+        </p:pic>
+        <p:pic>
+          <p:nvPicPr>
+            <p:cNvPr id="14" name="图片 13">
+              <a:extLst>
+                <a:ext uri="{FF2B5EF4-FFF2-40B4-BE49-F238E27FC236}">
+                  <a16:creationId xmlns:a16="http://schemas.microsoft.com/office/drawing/2014/main" id="{C180ED87-4CC5-46A7-B61A-B7A0D6C69120}"/>
+                </a:ext>
+              </a:extLst>
+            </p:cNvPr>
+            <p:cNvPicPr>
+              <a:picLocks noChangeAspect="1"/>
+            </p:cNvPicPr>
+            <p:nvPr/>
+          </p:nvPicPr>
+          <p:blipFill rotWithShape="1">
+            <a:blip r:embed="rId3"/>
+            <a:srcRect l="67336"/>
+            <a:stretch/>
+          </p:blipFill>
+          <p:spPr>
+            <a:xfrm>
+              <a:off x="1645599" y="3240437"/>
+              <a:ext cx="1852588" cy="1443487"/>
+            </a:xfrm>
+            <a:prstGeom prst="rect">
+              <a:avLst/>
+            </a:prstGeom>
+          </p:spPr>
+        </p:pic>
+      </p:grpSp>
+    </p:spTree>
+    <p:extLst>
+      <p:ext uri="{BB962C8B-B14F-4D97-AF65-F5344CB8AC3E}">
+        <p14:creationId xmlns:p14="http://schemas.microsoft.com/office/powerpoint/2010/main" val="3812887513"/>
+      </p:ext>
+    </p:extLst>
+  </p:cSld>
+  <p:clrMapOvr>
+    <a:masterClrMapping/>
+  </p:clrMapOvr>
+</p:sld>
+</file>
+
+<file path=ppt/slides/slide2.xml><?xml version="1.0" encoding="utf-8"?>
+<p:sld xmlns:a="http://schemas.openxmlformats.org/drawingml/2006/main" xmlns:r="http://schemas.openxmlformats.org/officeDocument/2006/relationships" xmlns:p="http://schemas.openxmlformats.org/presentationml/2006/main">
+  <p:cSld>
+    <p:spTree>
+      <p:nvGrpSpPr>
+        <p:cNvPr id="1" name=""/>
+        <p:cNvGrpSpPr/>
+        <p:nvPr/>
+      </p:nvGrpSpPr>
+      <p:grpSpPr>
+        <a:xfrm>
+          <a:off x="0" y="0"/>
+          <a:ext cx="0" cy="0"/>
+          <a:chOff x="0" y="0"/>
+          <a:chExt cx="0" cy="0"/>
+        </a:xfrm>
+      </p:grpSpPr>
+      <p:graphicFrame>
+        <p:nvGraphicFramePr>
+          <p:cNvPr id="5" name="表格 4">
+            <a:extLst>
+              <a:ext uri="{FF2B5EF4-FFF2-40B4-BE49-F238E27FC236}">
+                <a16:creationId xmlns:a16="http://schemas.microsoft.com/office/drawing/2014/main" id="{44B37126-2BD3-485B-8885-AB4143F9DD02}"/>
+              </a:ext>
+            </a:extLst>
+          </p:cNvPr>
+          <p:cNvGraphicFramePr>
+            <a:graphicFrameLocks noGrp="1"/>
+          </p:cNvGraphicFramePr>
+          <p:nvPr>
+            <p:extLst>
+              <p:ext uri="{D42A27DB-BD31-4B8C-83A1-F6EECF244321}">
                 <p14:modId xmlns:p14="http://schemas.microsoft.com/office/powerpoint/2010/main" val="1580322900"/>
               </p:ext>
             </p:extLst>
@@ -4761,7 +5437,7 @@
 </p:sld>
 </file>
 
-<file path=ppt/slides/slide2.xml><?xml version="1.0" encoding="utf-8"?>
+<file path=ppt/slides/slide3.xml><?xml version="1.0" encoding="utf-8"?>
 <p:sld xmlns:a="http://schemas.openxmlformats.org/drawingml/2006/main" xmlns:r="http://schemas.openxmlformats.org/officeDocument/2006/relationships" xmlns:p="http://schemas.openxmlformats.org/presentationml/2006/main">
   <p:cSld>
     <p:spTree>
@@ -5272,422 +5948,6 @@
 </p:sld>
 </file>
 
-<file path=ppt/slides/slide3.xml><?xml version="1.0" encoding="utf-8"?>
-<p:sld xmlns:a="http://schemas.openxmlformats.org/drawingml/2006/main" xmlns:r="http://schemas.openxmlformats.org/officeDocument/2006/relationships" xmlns:p="http://schemas.openxmlformats.org/presentationml/2006/main">
-  <p:cSld>
-    <p:spTree>
-      <p:nvGrpSpPr>
-        <p:cNvPr id="1" name=""/>
-        <p:cNvGrpSpPr/>
-        <p:nvPr/>
-      </p:nvGrpSpPr>
-      <p:grpSpPr>
-        <a:xfrm>
-          <a:off x="0" y="0"/>
-          <a:ext cx="0" cy="0"/>
-          <a:chOff x="0" y="0"/>
-          <a:chExt cx="0" cy="0"/>
-        </a:xfrm>
-      </p:grpSpPr>
-      <p:graphicFrame>
-        <p:nvGraphicFramePr>
-          <p:cNvPr id="5" name="表格 4">
-            <a:extLst>
-              <a:ext uri="{FF2B5EF4-FFF2-40B4-BE49-F238E27FC236}">
-                <a16:creationId xmlns:a16="http://schemas.microsoft.com/office/drawing/2014/main" id="{44B37126-2BD3-485B-8885-AB4143F9DD02}"/>
-              </a:ext>
-            </a:extLst>
-          </p:cNvPr>
-          <p:cNvGraphicFramePr>
-            <a:graphicFrameLocks noGrp="1"/>
-          </p:cNvGraphicFramePr>
-          <p:nvPr>
-            <p:extLst>
-              <p:ext uri="{D42A27DB-BD31-4B8C-83A1-F6EECF244321}">
-                <p14:modId xmlns:p14="http://schemas.microsoft.com/office/powerpoint/2010/main" val="2486167403"/>
-              </p:ext>
-            </p:extLst>
-          </p:nvPr>
-        </p:nvGraphicFramePr>
-        <p:xfrm>
-          <a:off x="2445079" y="757460"/>
-          <a:ext cx="7301838" cy="741680"/>
-        </p:xfrm>
-        <a:graphic>
-          <a:graphicData uri="http://schemas.openxmlformats.org/drawingml/2006/table">
-            <a:tbl>
-              <a:tblPr firstRow="1" bandRow="1">
-                <a:tableStyleId>{C083E6E3-FA7D-4D7B-A595-EF9225AFEA82}</a:tableStyleId>
-              </a:tblPr>
-              <a:tblGrid>
-                <a:gridCol w="3240000">
-                  <a:extLst>
-                    <a:ext uri="{9D8B030D-6E8A-4147-A177-3AD203B41FA5}">
-                      <a16:colId xmlns:a16="http://schemas.microsoft.com/office/drawing/2014/main" val="1730557754"/>
-                    </a:ext>
-                  </a:extLst>
-                </a:gridCol>
-                <a:gridCol w="2029838">
-                  <a:extLst>
-                    <a:ext uri="{9D8B030D-6E8A-4147-A177-3AD203B41FA5}">
-                      <a16:colId xmlns:a16="http://schemas.microsoft.com/office/drawing/2014/main" val="1207819439"/>
-                    </a:ext>
-                  </a:extLst>
-                </a:gridCol>
-                <a:gridCol w="2032000">
-                  <a:extLst>
-                    <a:ext uri="{9D8B030D-6E8A-4147-A177-3AD203B41FA5}">
-                      <a16:colId xmlns:a16="http://schemas.microsoft.com/office/drawing/2014/main" val="3675628301"/>
-                    </a:ext>
-                  </a:extLst>
-                </a:gridCol>
-              </a:tblGrid>
-              <a:tr h="370840">
-                <a:tc>
-                  <a:txBody>
-                    <a:bodyPr/>
-                    <a:lstStyle/>
-                    <a:p>
-                      <a:r>
-                        <a:rPr lang="en-US" altLang="zh-CN" dirty="0">
-                          <a:latin typeface="Calibri" panose="020F0502020204030204" pitchFamily="34" charset="0"/>
-                          <a:cs typeface="Calibri" panose="020F0502020204030204" pitchFamily="34" charset="0"/>
-                        </a:rPr>
-                        <a:t>DOI</a:t>
-                      </a:r>
-                      <a:endParaRPr lang="zh-CN" altLang="en-US" dirty="0">
-                        <a:latin typeface="Calibri" panose="020F0502020204030204" pitchFamily="34" charset="0"/>
-                        <a:cs typeface="Calibri" panose="020F0502020204030204" pitchFamily="34" charset="0"/>
-                      </a:endParaRPr>
-                    </a:p>
-                  </a:txBody>
-                  <a:tcPr/>
-                </a:tc>
-                <a:tc>
-                  <a:txBody>
-                    <a:bodyPr/>
-                    <a:lstStyle/>
-                    <a:p>
-                      <a:r>
-                        <a:rPr lang="en-US" altLang="zh-CN" dirty="0">
-                          <a:latin typeface="Calibri" panose="020F0502020204030204" pitchFamily="34" charset="0"/>
-                          <a:cs typeface="Calibri" panose="020F0502020204030204" pitchFamily="34" charset="0"/>
-                        </a:rPr>
-                        <a:t>POI</a:t>
-                      </a:r>
-                      <a:endParaRPr lang="zh-CN" altLang="en-US" dirty="0">
-                        <a:latin typeface="Calibri" panose="020F0502020204030204" pitchFamily="34" charset="0"/>
-                        <a:cs typeface="Calibri" panose="020F0502020204030204" pitchFamily="34" charset="0"/>
-                      </a:endParaRPr>
-                    </a:p>
-                  </a:txBody>
-                  <a:tcPr/>
-                </a:tc>
-                <a:tc>
-                  <a:txBody>
-                    <a:bodyPr/>
-                    <a:lstStyle/>
-                    <a:p>
-                      <a:r>
-                        <a:rPr lang="en-US" altLang="zh-CN" dirty="0">
-                          <a:latin typeface="Calibri" panose="020F0502020204030204" pitchFamily="34" charset="0"/>
-                          <a:cs typeface="Calibri" panose="020F0502020204030204" pitchFamily="34" charset="0"/>
-                        </a:rPr>
-                        <a:t>RANK</a:t>
-                      </a:r>
-                      <a:endParaRPr lang="zh-CN" altLang="en-US" dirty="0">
-                        <a:latin typeface="Calibri" panose="020F0502020204030204" pitchFamily="34" charset="0"/>
-                        <a:cs typeface="Calibri" panose="020F0502020204030204" pitchFamily="34" charset="0"/>
-                      </a:endParaRPr>
-                    </a:p>
-                  </a:txBody>
-                  <a:tcPr/>
-                </a:tc>
-                <a:extLst>
-                  <a:ext uri="{0D108BD9-81ED-4DB2-BD59-A6C34878D82A}">
-                    <a16:rowId xmlns:a16="http://schemas.microsoft.com/office/drawing/2014/main" val="1875668321"/>
-                  </a:ext>
-                </a:extLst>
-              </a:tr>
-              <a:tr h="370840">
-                <a:tc>
-                  <a:txBody>
-                    <a:bodyPr/>
-                    <a:lstStyle/>
-                    <a:p>
-                      <a:r>
-                        <a:rPr lang="en-US" altLang="zh-CN" dirty="0">
-                          <a:latin typeface="Calibri" panose="020F0502020204030204" pitchFamily="34" charset="0"/>
-                          <a:cs typeface="Calibri" panose="020F0502020204030204" pitchFamily="34" charset="0"/>
-                        </a:rPr>
-                        <a:t>10.1371/journal.pone.0034354</a:t>
-                      </a:r>
-                      <a:endParaRPr lang="zh-CN" altLang="en-US" dirty="0">
-                        <a:latin typeface="Calibri" panose="020F0502020204030204" pitchFamily="34" charset="0"/>
-                        <a:cs typeface="Calibri" panose="020F0502020204030204" pitchFamily="34" charset="0"/>
-                      </a:endParaRPr>
-                    </a:p>
-                  </a:txBody>
-                  <a:tcPr/>
-                </a:tc>
-                <a:tc>
-                  <a:txBody>
-                    <a:bodyPr/>
-                    <a:lstStyle/>
-                    <a:p>
-                      <a:r>
-                        <a:rPr lang="el-GR" altLang="zh-CN" dirty="0">
-                          <a:latin typeface="Calibri" panose="020F0502020204030204" pitchFamily="34" charset="0"/>
-                          <a:cs typeface="Calibri" panose="020F0502020204030204" pitchFamily="34" charset="0"/>
-                        </a:rPr>
-                        <a:t>α-</a:t>
-                      </a:r>
-                      <a:r>
-                        <a:rPr lang="en-US" altLang="zh-CN" dirty="0">
-                          <a:latin typeface="Calibri" panose="020F0502020204030204" pitchFamily="34" charset="0"/>
-                          <a:cs typeface="Calibri" panose="020F0502020204030204" pitchFamily="34" charset="0"/>
-                        </a:rPr>
-                        <a:t>thrombin</a:t>
-                      </a:r>
-                      <a:endParaRPr lang="zh-CN" altLang="en-US" dirty="0">
-                        <a:latin typeface="Calibri" panose="020F0502020204030204" pitchFamily="34" charset="0"/>
-                        <a:cs typeface="Calibri" panose="020F0502020204030204" pitchFamily="34" charset="0"/>
-                      </a:endParaRPr>
-                    </a:p>
-                  </a:txBody>
-                  <a:tcPr/>
-                </a:tc>
-                <a:tc>
-                  <a:txBody>
-                    <a:bodyPr/>
-                    <a:lstStyle/>
-                    <a:p>
-                      <a:r>
-                        <a:rPr lang="en-US" altLang="zh-CN" dirty="0">
-                          <a:latin typeface="Calibri" panose="020F0502020204030204" pitchFamily="34" charset="0"/>
-                          <a:cs typeface="Calibri" panose="020F0502020204030204" pitchFamily="34" charset="0"/>
-                        </a:rPr>
-                        <a:t>5</a:t>
-                      </a:r>
-                      <a:endParaRPr lang="zh-CN" altLang="en-US" dirty="0">
-                        <a:latin typeface="Calibri" panose="020F0502020204030204" pitchFamily="34" charset="0"/>
-                        <a:cs typeface="Calibri" panose="020F0502020204030204" pitchFamily="34" charset="0"/>
-                      </a:endParaRPr>
-                    </a:p>
-                  </a:txBody>
-                  <a:tcPr/>
-                </a:tc>
-                <a:extLst>
-                  <a:ext uri="{0D108BD9-81ED-4DB2-BD59-A6C34878D82A}">
-                    <a16:rowId xmlns:a16="http://schemas.microsoft.com/office/drawing/2014/main" val="3942900020"/>
-                  </a:ext>
-                </a:extLst>
-              </a:tr>
-            </a:tbl>
-          </a:graphicData>
-        </a:graphic>
-      </p:graphicFrame>
-      <p:sp>
-        <p:nvSpPr>
-          <p:cNvPr id="13" name="文本框 12">
-            <a:extLst>
-              <a:ext uri="{FF2B5EF4-FFF2-40B4-BE49-F238E27FC236}">
-                <a16:creationId xmlns:a16="http://schemas.microsoft.com/office/drawing/2014/main" id="{1C430567-FB19-4B05-8A46-57292461E5E6}"/>
-              </a:ext>
-            </a:extLst>
-          </p:cNvPr>
-          <p:cNvSpPr txBox="1"/>
-          <p:nvPr/>
-        </p:nvSpPr>
-        <p:spPr>
-          <a:xfrm>
-            <a:off x="2258437" y="4900210"/>
-            <a:ext cx="7675125" cy="646331"/>
-          </a:xfrm>
-          <a:prstGeom prst="rect">
-            <a:avLst/>
-          </a:prstGeom>
-          <a:noFill/>
-        </p:spPr>
-        <p:txBody>
-          <a:bodyPr wrap="square" rtlCol="0">
-            <a:spAutoFit/>
-          </a:bodyPr>
-          <a:lstStyle/>
-          <a:p>
-            <a:r>
-              <a:rPr lang="en-US" altLang="zh-CN" dirty="0">
-                <a:latin typeface="Calibri" panose="020F0502020204030204" pitchFamily="34" charset="0"/>
-                <a:cs typeface="Calibri" panose="020F0502020204030204" pitchFamily="34" charset="0"/>
-              </a:rPr>
-              <a:t>Notes: </a:t>
-            </a:r>
-          </a:p>
-          <a:p>
-            <a:pPr marL="285750" indent="-285750">
-              <a:buFont typeface="Wingdings" panose="05000000000000000000" pitchFamily="2" charset="2"/>
-              <a:buChar char="ü"/>
-            </a:pPr>
-            <a:r>
-              <a:rPr lang="en-US" altLang="zh-CN" dirty="0">
-                <a:latin typeface="Calibri" panose="020F0502020204030204" pitchFamily="34" charset="0"/>
-                <a:cs typeface="Calibri" panose="020F0502020204030204" pitchFamily="34" charset="0"/>
-              </a:rPr>
-              <a:t>Containing D-type amino acids with thorough data</a:t>
-            </a:r>
-          </a:p>
-        </p:txBody>
-      </p:sp>
-      <p:pic>
-        <p:nvPicPr>
-          <p:cNvPr id="6" name="图片 5">
-            <a:extLst>
-              <a:ext uri="{FF2B5EF4-FFF2-40B4-BE49-F238E27FC236}">
-                <a16:creationId xmlns:a16="http://schemas.microsoft.com/office/drawing/2014/main" id="{55817B29-E010-4204-8AEC-C64D0D4D709C}"/>
-              </a:ext>
-            </a:extLst>
-          </p:cNvPr>
-          <p:cNvPicPr>
-            <a:picLocks noChangeAspect="1"/>
-          </p:cNvPicPr>
-          <p:nvPr/>
-        </p:nvPicPr>
-        <p:blipFill rotWithShape="1">
-          <a:blip r:embed="rId2"/>
-          <a:srcRect b="50000"/>
-          <a:stretch/>
-        </p:blipFill>
-        <p:spPr>
-          <a:xfrm>
-            <a:off x="4576415" y="1883911"/>
-            <a:ext cx="3520745" cy="3090178"/>
-          </a:xfrm>
-          <a:prstGeom prst="rect">
-            <a:avLst/>
-          </a:prstGeom>
-        </p:spPr>
-      </p:pic>
-      <p:pic>
-        <p:nvPicPr>
-          <p:cNvPr id="11" name="图片 10">
-            <a:extLst>
-              <a:ext uri="{FF2B5EF4-FFF2-40B4-BE49-F238E27FC236}">
-                <a16:creationId xmlns:a16="http://schemas.microsoft.com/office/drawing/2014/main" id="{68CD98A9-862F-4A36-BEA1-0987AFC735CC}"/>
-              </a:ext>
-            </a:extLst>
-          </p:cNvPr>
-          <p:cNvPicPr>
-            <a:picLocks noChangeAspect="1"/>
-          </p:cNvPicPr>
-          <p:nvPr/>
-        </p:nvPicPr>
-        <p:blipFill rotWithShape="1">
-          <a:blip r:embed="rId2"/>
-          <a:srcRect t="50000"/>
-          <a:stretch/>
-        </p:blipFill>
-        <p:spPr>
-          <a:xfrm>
-            <a:off x="8415002" y="1957790"/>
-            <a:ext cx="3520745" cy="3090178"/>
-          </a:xfrm>
-          <a:prstGeom prst="rect">
-            <a:avLst/>
-          </a:prstGeom>
-        </p:spPr>
-      </p:pic>
-      <p:grpSp>
-        <p:nvGrpSpPr>
-          <p:cNvPr id="8" name="组合 7">
-            <a:extLst>
-              <a:ext uri="{FF2B5EF4-FFF2-40B4-BE49-F238E27FC236}">
-                <a16:creationId xmlns:a16="http://schemas.microsoft.com/office/drawing/2014/main" id="{529D37E2-F279-4E5C-8A95-198EE940C1F8}"/>
-              </a:ext>
-            </a:extLst>
-          </p:cNvPr>
-          <p:cNvGrpSpPr/>
-          <p:nvPr/>
-        </p:nvGrpSpPr>
-        <p:grpSpPr>
-          <a:xfrm>
-            <a:off x="444972" y="1957790"/>
-            <a:ext cx="3813601" cy="2886974"/>
-            <a:chOff x="665093" y="1796950"/>
-            <a:chExt cx="3813601" cy="2886974"/>
-          </a:xfrm>
-        </p:grpSpPr>
-        <p:pic>
-          <p:nvPicPr>
-            <p:cNvPr id="3" name="图片 2">
-              <a:extLst>
-                <a:ext uri="{FF2B5EF4-FFF2-40B4-BE49-F238E27FC236}">
-                  <a16:creationId xmlns:a16="http://schemas.microsoft.com/office/drawing/2014/main" id="{C23358FE-10C4-4FC6-837D-5E6929EB2568}"/>
-                </a:ext>
-              </a:extLst>
-            </p:cNvPr>
-            <p:cNvPicPr>
-              <a:picLocks noChangeAspect="1"/>
-            </p:cNvPicPr>
-            <p:nvPr/>
-          </p:nvPicPr>
-          <p:blipFill rotWithShape="1">
-            <a:blip r:embed="rId3"/>
-            <a:srcRect l="1" r="32759"/>
-            <a:stretch/>
-          </p:blipFill>
-          <p:spPr>
-            <a:xfrm>
-              <a:off x="665093" y="1796950"/>
-              <a:ext cx="3813601" cy="1443487"/>
-            </a:xfrm>
-            <a:prstGeom prst="rect">
-              <a:avLst/>
-            </a:prstGeom>
-          </p:spPr>
-        </p:pic>
-        <p:pic>
-          <p:nvPicPr>
-            <p:cNvPr id="14" name="图片 13">
-              <a:extLst>
-                <a:ext uri="{FF2B5EF4-FFF2-40B4-BE49-F238E27FC236}">
-                  <a16:creationId xmlns:a16="http://schemas.microsoft.com/office/drawing/2014/main" id="{C180ED87-4CC5-46A7-B61A-B7A0D6C69120}"/>
-                </a:ext>
-              </a:extLst>
-            </p:cNvPr>
-            <p:cNvPicPr>
-              <a:picLocks noChangeAspect="1"/>
-            </p:cNvPicPr>
-            <p:nvPr/>
-          </p:nvPicPr>
-          <p:blipFill rotWithShape="1">
-            <a:blip r:embed="rId3"/>
-            <a:srcRect l="67336"/>
-            <a:stretch/>
-          </p:blipFill>
-          <p:spPr>
-            <a:xfrm>
-              <a:off x="1645599" y="3240437"/>
-              <a:ext cx="1852588" cy="1443487"/>
-            </a:xfrm>
-            <a:prstGeom prst="rect">
-              <a:avLst/>
-            </a:prstGeom>
-          </p:spPr>
-        </p:pic>
-      </p:grpSp>
-    </p:spTree>
-    <p:extLst>
-      <p:ext uri="{BB962C8B-B14F-4D97-AF65-F5344CB8AC3E}">
-        <p14:creationId xmlns:p14="http://schemas.microsoft.com/office/powerpoint/2010/main" val="3812887513"/>
-      </p:ext>
-    </p:extLst>
-  </p:cSld>
-  <p:clrMapOvr>
-    <a:masterClrMapping/>
-  </p:clrMapOvr>
-</p:sld>
-</file>
-
 <file path=ppt/slides/slide4.xml><?xml version="1.0" encoding="utf-8"?>
 <p:sld xmlns:a="http://schemas.openxmlformats.org/drawingml/2006/main" xmlns:r="http://schemas.openxmlformats.org/officeDocument/2006/relationships" xmlns:p="http://schemas.openxmlformats.org/presentationml/2006/main">
   <p:cSld>
@@ -6721,6 +6981,1270 @@
     <p:extLst>
       <p:ext uri="{BB962C8B-B14F-4D97-AF65-F5344CB8AC3E}">
         <p14:creationId xmlns:p14="http://schemas.microsoft.com/office/powerpoint/2010/main" val="4237397214"/>
+      </p:ext>
+    </p:extLst>
+  </p:cSld>
+  <p:clrMapOvr>
+    <a:masterClrMapping/>
+  </p:clrMapOvr>
+</p:sld>
+</file>
+
+<file path=ppt/slides/slide6.xml><?xml version="1.0" encoding="utf-8"?>
+<p:sld xmlns:a="http://schemas.openxmlformats.org/drawingml/2006/main" xmlns:r="http://schemas.openxmlformats.org/officeDocument/2006/relationships" xmlns:p="http://schemas.openxmlformats.org/presentationml/2006/main">
+  <p:cSld>
+    <p:spTree>
+      <p:nvGrpSpPr>
+        <p:cNvPr id="1" name=""/>
+        <p:cNvGrpSpPr/>
+        <p:nvPr/>
+      </p:nvGrpSpPr>
+      <p:grpSpPr>
+        <a:xfrm>
+          <a:off x="0" y="0"/>
+          <a:ext cx="0" cy="0"/>
+          <a:chOff x="0" y="0"/>
+          <a:chExt cx="0" cy="0"/>
+        </a:xfrm>
+      </p:grpSpPr>
+      <p:pic>
+        <p:nvPicPr>
+          <p:cNvPr id="2" name="图片 1">
+            <a:extLst>
+              <a:ext uri="{FF2B5EF4-FFF2-40B4-BE49-F238E27FC236}">
+                <a16:creationId xmlns:a16="http://schemas.microsoft.com/office/drawing/2014/main" id="{0707A8A7-E92E-4697-BCB0-7611ED07C8CF}"/>
+              </a:ext>
+            </a:extLst>
+          </p:cNvPr>
+          <p:cNvPicPr>
+            <a:picLocks noChangeAspect="1"/>
+          </p:cNvPicPr>
+          <p:nvPr/>
+        </p:nvPicPr>
+        <p:blipFill>
+          <a:blip r:embed="rId3"/>
+          <a:stretch>
+            <a:fillRect/>
+          </a:stretch>
+        </p:blipFill>
+        <p:spPr>
+          <a:xfrm>
+            <a:off x="4620581" y="2092618"/>
+            <a:ext cx="5787342" cy="2214113"/>
+          </a:xfrm>
+          <a:prstGeom prst="rect">
+            <a:avLst/>
+          </a:prstGeom>
+        </p:spPr>
+      </p:pic>
+      <p:pic>
+        <p:nvPicPr>
+          <p:cNvPr id="12" name="图片 11">
+            <a:extLst>
+              <a:ext uri="{FF2B5EF4-FFF2-40B4-BE49-F238E27FC236}">
+                <a16:creationId xmlns:a16="http://schemas.microsoft.com/office/drawing/2014/main" id="{6BEA7D99-57AF-4614-8CE3-EE01BAAD2878}"/>
+              </a:ext>
+            </a:extLst>
+          </p:cNvPr>
+          <p:cNvPicPr>
+            <a:picLocks noChangeAspect="1"/>
+          </p:cNvPicPr>
+          <p:nvPr/>
+        </p:nvPicPr>
+        <p:blipFill rotWithShape="1">
+          <a:blip r:embed="rId4"/>
+          <a:srcRect l="19954" t="4013" r="28990" b="4450"/>
+          <a:stretch/>
+        </p:blipFill>
+        <p:spPr>
+          <a:xfrm>
+            <a:off x="2223882" y="1735517"/>
+            <a:ext cx="1967753" cy="2928315"/>
+          </a:xfrm>
+          <a:prstGeom prst="rect">
+            <a:avLst/>
+          </a:prstGeom>
+        </p:spPr>
+      </p:pic>
+      <p:graphicFrame>
+        <p:nvGraphicFramePr>
+          <p:cNvPr id="5" name="表格 4">
+            <a:extLst>
+              <a:ext uri="{FF2B5EF4-FFF2-40B4-BE49-F238E27FC236}">
+                <a16:creationId xmlns:a16="http://schemas.microsoft.com/office/drawing/2014/main" id="{44B37126-2BD3-485B-8885-AB4143F9DD02}"/>
+              </a:ext>
+            </a:extLst>
+          </p:cNvPr>
+          <p:cNvGraphicFramePr>
+            <a:graphicFrameLocks noGrp="1"/>
+          </p:cNvGraphicFramePr>
+          <p:nvPr>
+            <p:extLst>
+              <p:ext uri="{D42A27DB-BD31-4B8C-83A1-F6EECF244321}">
+                <p14:modId xmlns:p14="http://schemas.microsoft.com/office/powerpoint/2010/main" val="2793951320"/>
+              </p:ext>
+            </p:extLst>
+          </p:nvPr>
+        </p:nvGraphicFramePr>
+        <p:xfrm>
+          <a:off x="2445079" y="757460"/>
+          <a:ext cx="7301838" cy="741680"/>
+        </p:xfrm>
+        <a:graphic>
+          <a:graphicData uri="http://schemas.openxmlformats.org/drawingml/2006/table">
+            <a:tbl>
+              <a:tblPr firstRow="1" bandRow="1">
+                <a:tableStyleId>{C083E6E3-FA7D-4D7B-A595-EF9225AFEA82}</a:tableStyleId>
+              </a:tblPr>
+              <a:tblGrid>
+                <a:gridCol w="3240000">
+                  <a:extLst>
+                    <a:ext uri="{9D8B030D-6E8A-4147-A177-3AD203B41FA5}">
+                      <a16:colId xmlns:a16="http://schemas.microsoft.com/office/drawing/2014/main" val="1730557754"/>
+                    </a:ext>
+                  </a:extLst>
+                </a:gridCol>
+                <a:gridCol w="2029838">
+                  <a:extLst>
+                    <a:ext uri="{9D8B030D-6E8A-4147-A177-3AD203B41FA5}">
+                      <a16:colId xmlns:a16="http://schemas.microsoft.com/office/drawing/2014/main" val="1207819439"/>
+                    </a:ext>
+                  </a:extLst>
+                </a:gridCol>
+                <a:gridCol w="2032000">
+                  <a:extLst>
+                    <a:ext uri="{9D8B030D-6E8A-4147-A177-3AD203B41FA5}">
+                      <a16:colId xmlns:a16="http://schemas.microsoft.com/office/drawing/2014/main" val="3675628301"/>
+                    </a:ext>
+                  </a:extLst>
+                </a:gridCol>
+              </a:tblGrid>
+              <a:tr h="370840">
+                <a:tc>
+                  <a:txBody>
+                    <a:bodyPr/>
+                    <a:lstStyle/>
+                    <a:p>
+                      <a:r>
+                        <a:rPr lang="en-US" altLang="zh-CN" dirty="0">
+                          <a:latin typeface="Calibri" panose="020F0502020204030204" pitchFamily="34" charset="0"/>
+                          <a:cs typeface="Calibri" panose="020F0502020204030204" pitchFamily="34" charset="0"/>
+                        </a:rPr>
+                        <a:t>DOI</a:t>
+                      </a:r>
+                      <a:endParaRPr lang="zh-CN" altLang="en-US" dirty="0">
+                        <a:latin typeface="Calibri" panose="020F0502020204030204" pitchFamily="34" charset="0"/>
+                        <a:cs typeface="Calibri" panose="020F0502020204030204" pitchFamily="34" charset="0"/>
+                      </a:endParaRPr>
+                    </a:p>
+                  </a:txBody>
+                  <a:tcPr/>
+                </a:tc>
+                <a:tc>
+                  <a:txBody>
+                    <a:bodyPr/>
+                    <a:lstStyle/>
+                    <a:p>
+                      <a:r>
+                        <a:rPr lang="en-US" altLang="zh-CN" dirty="0">
+                          <a:latin typeface="Calibri" panose="020F0502020204030204" pitchFamily="34" charset="0"/>
+                          <a:cs typeface="Calibri" panose="020F0502020204030204" pitchFamily="34" charset="0"/>
+                        </a:rPr>
+                        <a:t>POI</a:t>
+                      </a:r>
+                      <a:endParaRPr lang="zh-CN" altLang="en-US" dirty="0">
+                        <a:latin typeface="Calibri" panose="020F0502020204030204" pitchFamily="34" charset="0"/>
+                        <a:cs typeface="Calibri" panose="020F0502020204030204" pitchFamily="34" charset="0"/>
+                      </a:endParaRPr>
+                    </a:p>
+                  </a:txBody>
+                  <a:tcPr/>
+                </a:tc>
+                <a:tc>
+                  <a:txBody>
+                    <a:bodyPr/>
+                    <a:lstStyle/>
+                    <a:p>
+                      <a:r>
+                        <a:rPr lang="en-US" altLang="zh-CN" dirty="0">
+                          <a:latin typeface="Calibri" panose="020F0502020204030204" pitchFamily="34" charset="0"/>
+                          <a:cs typeface="Calibri" panose="020F0502020204030204" pitchFamily="34" charset="0"/>
+                        </a:rPr>
+                        <a:t>RANK</a:t>
+                      </a:r>
+                      <a:endParaRPr lang="zh-CN" altLang="en-US" dirty="0">
+                        <a:latin typeface="Calibri" panose="020F0502020204030204" pitchFamily="34" charset="0"/>
+                        <a:cs typeface="Calibri" panose="020F0502020204030204" pitchFamily="34" charset="0"/>
+                      </a:endParaRPr>
+                    </a:p>
+                  </a:txBody>
+                  <a:tcPr/>
+                </a:tc>
+                <a:extLst>
+                  <a:ext uri="{0D108BD9-81ED-4DB2-BD59-A6C34878D82A}">
+                    <a16:rowId xmlns:a16="http://schemas.microsoft.com/office/drawing/2014/main" val="1875668321"/>
+                  </a:ext>
+                </a:extLst>
+              </a:tr>
+              <a:tr h="370840">
+                <a:tc>
+                  <a:txBody>
+                    <a:bodyPr/>
+                    <a:lstStyle/>
+                    <a:p>
+                      <a:r>
+                        <a:rPr lang="en-US" altLang="zh-CN" dirty="0">
+                          <a:latin typeface="Calibri" panose="020F0502020204030204" pitchFamily="34" charset="0"/>
+                          <a:cs typeface="Calibri" panose="020F0502020204030204" pitchFamily="34" charset="0"/>
+                        </a:rPr>
+                        <a:t>10.1021/jm300060k</a:t>
+                      </a:r>
+                      <a:endParaRPr lang="zh-CN" altLang="en-US" dirty="0">
+                        <a:latin typeface="Calibri" panose="020F0502020204030204" pitchFamily="34" charset="0"/>
+                        <a:cs typeface="Calibri" panose="020F0502020204030204" pitchFamily="34" charset="0"/>
+                      </a:endParaRPr>
+                    </a:p>
+                  </a:txBody>
+                  <a:tcPr/>
+                </a:tc>
+                <a:tc>
+                  <a:txBody>
+                    <a:bodyPr/>
+                    <a:lstStyle/>
+                    <a:p>
+                      <a:r>
+                        <a:rPr lang="en-US" altLang="zh-CN" dirty="0">
+                          <a:latin typeface="Calibri" panose="020F0502020204030204" pitchFamily="34" charset="0"/>
+                          <a:cs typeface="Calibri" panose="020F0502020204030204" pitchFamily="34" charset="0"/>
+                        </a:rPr>
+                        <a:t>IAP</a:t>
+                      </a:r>
+                      <a:endParaRPr lang="zh-CN" altLang="en-US" dirty="0">
+                        <a:latin typeface="Calibri" panose="020F0502020204030204" pitchFamily="34" charset="0"/>
+                        <a:cs typeface="Calibri" panose="020F0502020204030204" pitchFamily="34" charset="0"/>
+                      </a:endParaRPr>
+                    </a:p>
+                  </a:txBody>
+                  <a:tcPr/>
+                </a:tc>
+                <a:tc>
+                  <a:txBody>
+                    <a:bodyPr/>
+                    <a:lstStyle/>
+                    <a:p>
+                      <a:r>
+                        <a:rPr lang="en-US" altLang="zh-CN" dirty="0">
+                          <a:latin typeface="Calibri" panose="020F0502020204030204" pitchFamily="34" charset="0"/>
+                          <a:cs typeface="Calibri" panose="020F0502020204030204" pitchFamily="34" charset="0"/>
+                        </a:rPr>
+                        <a:t>4</a:t>
+                      </a:r>
+                      <a:endParaRPr lang="zh-CN" altLang="en-US" dirty="0">
+                        <a:latin typeface="Calibri" panose="020F0502020204030204" pitchFamily="34" charset="0"/>
+                        <a:cs typeface="Calibri" panose="020F0502020204030204" pitchFamily="34" charset="0"/>
+                      </a:endParaRPr>
+                    </a:p>
+                  </a:txBody>
+                  <a:tcPr/>
+                </a:tc>
+                <a:extLst>
+                  <a:ext uri="{0D108BD9-81ED-4DB2-BD59-A6C34878D82A}">
+                    <a16:rowId xmlns:a16="http://schemas.microsoft.com/office/drawing/2014/main" val="3942900020"/>
+                  </a:ext>
+                </a:extLst>
+              </a:tr>
+            </a:tbl>
+          </a:graphicData>
+        </a:graphic>
+      </p:graphicFrame>
+      <p:sp>
+        <p:nvSpPr>
+          <p:cNvPr id="13" name="文本框 12">
+            <a:extLst>
+              <a:ext uri="{FF2B5EF4-FFF2-40B4-BE49-F238E27FC236}">
+                <a16:creationId xmlns:a16="http://schemas.microsoft.com/office/drawing/2014/main" id="{1C430567-FB19-4B05-8A46-57292461E5E6}"/>
+              </a:ext>
+            </a:extLst>
+          </p:cNvPr>
+          <p:cNvSpPr txBox="1"/>
+          <p:nvPr/>
+        </p:nvSpPr>
+        <p:spPr>
+          <a:xfrm>
+            <a:off x="2258437" y="4900210"/>
+            <a:ext cx="7675125" cy="1200329"/>
+          </a:xfrm>
+          <a:prstGeom prst="rect">
+            <a:avLst/>
+          </a:prstGeom>
+          <a:noFill/>
+        </p:spPr>
+        <p:txBody>
+          <a:bodyPr wrap="square" rtlCol="0">
+            <a:spAutoFit/>
+          </a:bodyPr>
+          <a:lstStyle/>
+          <a:p>
+            <a:r>
+              <a:rPr lang="en-US" altLang="zh-CN" dirty="0">
+                <a:latin typeface="Calibri" panose="020F0502020204030204" pitchFamily="34" charset="0"/>
+                <a:cs typeface="Calibri" panose="020F0502020204030204" pitchFamily="34" charset="0"/>
+              </a:rPr>
+              <a:t>Notes: </a:t>
+            </a:r>
+          </a:p>
+          <a:p>
+            <a:pPr marL="285750" indent="-285750">
+              <a:buFont typeface="Wingdings" panose="05000000000000000000" pitchFamily="2" charset="2"/>
+              <a:buChar char="ü"/>
+            </a:pPr>
+            <a:r>
+              <a:rPr lang="en-US" altLang="zh-CN" dirty="0">
+                <a:latin typeface="Calibri" panose="020F0502020204030204" pitchFamily="34" charset="0"/>
+                <a:cs typeface="Calibri" panose="020F0502020204030204" pitchFamily="34" charset="0"/>
+              </a:rPr>
+              <a:t>Thorough data</a:t>
+            </a:r>
+          </a:p>
+          <a:p>
+            <a:pPr marL="285750" indent="-285750">
+              <a:buFont typeface="Arial" panose="020B0604020202020204" pitchFamily="34" charset="0"/>
+              <a:buChar char="•"/>
+            </a:pPr>
+            <a:r>
+              <a:rPr lang="en-US" altLang="zh-CN" dirty="0">
+                <a:latin typeface="Calibri" panose="020F0502020204030204" pitchFamily="34" charset="0"/>
+                <a:cs typeface="Calibri" panose="020F0502020204030204" pitchFamily="34" charset="0"/>
+              </a:rPr>
+              <a:t>Containing a cyclohexyl group in </a:t>
+            </a:r>
+            <a:r>
+              <a:rPr lang="en-US" altLang="zh-CN" dirty="0" err="1">
+                <a:latin typeface="Calibri" panose="020F0502020204030204" pitchFamily="34" charset="0"/>
+                <a:cs typeface="Calibri" panose="020F0502020204030204" pitchFamily="34" charset="0"/>
+              </a:rPr>
+              <a:t>ncaa</a:t>
+            </a:r>
+            <a:endParaRPr lang="en-US" altLang="zh-CN" dirty="0">
+              <a:latin typeface="Calibri" panose="020F0502020204030204" pitchFamily="34" charset="0"/>
+              <a:cs typeface="Calibri" panose="020F0502020204030204" pitchFamily="34" charset="0"/>
+            </a:endParaRPr>
+          </a:p>
+          <a:p>
+            <a:pPr marL="285750" indent="-285750">
+              <a:buFont typeface="Arial" panose="020B0604020202020204" pitchFamily="34" charset="0"/>
+              <a:buChar char="•"/>
+            </a:pPr>
+            <a:r>
+              <a:rPr lang="en-US" altLang="zh-CN" dirty="0">
+                <a:latin typeface="Calibri" panose="020F0502020204030204" pitchFamily="34" charset="0"/>
+                <a:cs typeface="Calibri" panose="020F0502020204030204" pitchFamily="34" charset="0"/>
+              </a:rPr>
+              <a:t>Capping group at N terminal</a:t>
+            </a:r>
+          </a:p>
+        </p:txBody>
+      </p:sp>
+      <p:cxnSp>
+        <p:nvCxnSpPr>
+          <p:cNvPr id="17" name="直接箭头连接符 16">
+            <a:extLst>
+              <a:ext uri="{FF2B5EF4-FFF2-40B4-BE49-F238E27FC236}">
+                <a16:creationId xmlns:a16="http://schemas.microsoft.com/office/drawing/2014/main" id="{1287C2DF-C291-46CC-8921-1C175B90EC59}"/>
+              </a:ext>
+            </a:extLst>
+          </p:cNvPr>
+          <p:cNvCxnSpPr/>
+          <p:nvPr/>
+        </p:nvCxnSpPr>
+        <p:spPr>
+          <a:xfrm>
+            <a:off x="2122476" y="4550489"/>
+            <a:ext cx="202811" cy="0"/>
+          </a:xfrm>
+          <a:prstGeom prst="straightConnector1">
+            <a:avLst/>
+          </a:prstGeom>
+          <a:ln>
+            <a:solidFill>
+              <a:srgbClr val="FF0000"/>
+            </a:solidFill>
+            <a:tailEnd type="triangle"/>
+          </a:ln>
+        </p:spPr>
+        <p:style>
+          <a:lnRef idx="1">
+            <a:schemeClr val="accent1"/>
+          </a:lnRef>
+          <a:fillRef idx="0">
+            <a:schemeClr val="accent1"/>
+          </a:fillRef>
+          <a:effectRef idx="0">
+            <a:schemeClr val="accent1"/>
+          </a:effectRef>
+          <a:fontRef idx="minor">
+            <a:schemeClr val="tx1"/>
+          </a:fontRef>
+        </p:style>
+      </p:cxnSp>
+      <p:sp>
+        <p:nvSpPr>
+          <p:cNvPr id="10" name="矩形 9">
+            <a:extLst>
+              <a:ext uri="{FF2B5EF4-FFF2-40B4-BE49-F238E27FC236}">
+                <a16:creationId xmlns:a16="http://schemas.microsoft.com/office/drawing/2014/main" id="{05749525-163A-498D-9490-F0593E0B3262}"/>
+              </a:ext>
+            </a:extLst>
+          </p:cNvPr>
+          <p:cNvSpPr/>
+          <p:nvPr/>
+        </p:nvSpPr>
+        <p:spPr>
+          <a:xfrm>
+            <a:off x="5996212" y="2584580"/>
+            <a:ext cx="460572" cy="615095"/>
+          </a:xfrm>
+          <a:prstGeom prst="rect">
+            <a:avLst/>
+          </a:prstGeom>
+          <a:noFill/>
+          <a:ln w="15875">
+            <a:solidFill>
+              <a:srgbClr val="FF0000"/>
+            </a:solidFill>
+            <a:prstDash val="dash"/>
+          </a:ln>
+        </p:spPr>
+        <p:style>
+          <a:lnRef idx="2">
+            <a:schemeClr val="accent1">
+              <a:shade val="50000"/>
+            </a:schemeClr>
+          </a:lnRef>
+          <a:fillRef idx="1">
+            <a:schemeClr val="accent1"/>
+          </a:fillRef>
+          <a:effectRef idx="0">
+            <a:schemeClr val="accent1"/>
+          </a:effectRef>
+          <a:fontRef idx="minor">
+            <a:schemeClr val="lt1"/>
+          </a:fontRef>
+        </p:style>
+        <p:txBody>
+          <a:bodyPr rtlCol="0" anchor="ctr"/>
+          <a:lstStyle/>
+          <a:p>
+            <a:pPr algn="ctr"/>
+            <a:endParaRPr lang="zh-CN" altLang="en-US"/>
+          </a:p>
+        </p:txBody>
+      </p:sp>
+    </p:spTree>
+    <p:extLst>
+      <p:ext uri="{BB962C8B-B14F-4D97-AF65-F5344CB8AC3E}">
+        <p14:creationId xmlns:p14="http://schemas.microsoft.com/office/powerpoint/2010/main" val="2897005623"/>
+      </p:ext>
+    </p:extLst>
+  </p:cSld>
+  <p:clrMapOvr>
+    <a:masterClrMapping/>
+  </p:clrMapOvr>
+</p:sld>
+</file>
+
+<file path=ppt/slides/slide7.xml><?xml version="1.0" encoding="utf-8"?>
+<p:sld xmlns:a="http://schemas.openxmlformats.org/drawingml/2006/main" xmlns:r="http://schemas.openxmlformats.org/officeDocument/2006/relationships" xmlns:p="http://schemas.openxmlformats.org/presentationml/2006/main">
+  <p:cSld>
+    <p:spTree>
+      <p:nvGrpSpPr>
+        <p:cNvPr id="1" name=""/>
+        <p:cNvGrpSpPr/>
+        <p:nvPr/>
+      </p:nvGrpSpPr>
+      <p:grpSpPr>
+        <a:xfrm>
+          <a:off x="0" y="0"/>
+          <a:ext cx="0" cy="0"/>
+          <a:chOff x="0" y="0"/>
+          <a:chExt cx="0" cy="0"/>
+        </a:xfrm>
+      </p:grpSpPr>
+      <p:pic>
+        <p:nvPicPr>
+          <p:cNvPr id="3" name="图片 2">
+            <a:extLst>
+              <a:ext uri="{FF2B5EF4-FFF2-40B4-BE49-F238E27FC236}">
+                <a16:creationId xmlns:a16="http://schemas.microsoft.com/office/drawing/2014/main" id="{120882C9-3503-4058-945F-FACCF926B9DA}"/>
+              </a:ext>
+            </a:extLst>
+          </p:cNvPr>
+          <p:cNvPicPr>
+            <a:picLocks noChangeAspect="1"/>
+          </p:cNvPicPr>
+          <p:nvPr/>
+        </p:nvPicPr>
+        <p:blipFill>
+          <a:blip r:embed="rId3"/>
+          <a:stretch>
+            <a:fillRect/>
+          </a:stretch>
+        </p:blipFill>
+        <p:spPr>
+          <a:xfrm>
+            <a:off x="6095998" y="1593124"/>
+            <a:ext cx="3620878" cy="3248252"/>
+          </a:xfrm>
+          <a:prstGeom prst="rect">
+            <a:avLst/>
+          </a:prstGeom>
+        </p:spPr>
+      </p:pic>
+      <p:pic>
+        <p:nvPicPr>
+          <p:cNvPr id="8" name="图片 7">
+            <a:extLst>
+              <a:ext uri="{FF2B5EF4-FFF2-40B4-BE49-F238E27FC236}">
+                <a16:creationId xmlns:a16="http://schemas.microsoft.com/office/drawing/2014/main" id="{7351941F-1D28-4E56-8EF8-621296C6F952}"/>
+              </a:ext>
+            </a:extLst>
+          </p:cNvPr>
+          <p:cNvPicPr>
+            <a:picLocks noChangeAspect="1"/>
+          </p:cNvPicPr>
+          <p:nvPr/>
+        </p:nvPicPr>
+        <p:blipFill>
+          <a:blip r:embed="rId4"/>
+          <a:stretch>
+            <a:fillRect/>
+          </a:stretch>
+        </p:blipFill>
+        <p:spPr>
+          <a:xfrm>
+            <a:off x="2880535" y="1593124"/>
+            <a:ext cx="2517725" cy="3248252"/>
+          </a:xfrm>
+          <a:prstGeom prst="rect">
+            <a:avLst/>
+          </a:prstGeom>
+        </p:spPr>
+      </p:pic>
+      <p:graphicFrame>
+        <p:nvGraphicFramePr>
+          <p:cNvPr id="5" name="表格 4">
+            <a:extLst>
+              <a:ext uri="{FF2B5EF4-FFF2-40B4-BE49-F238E27FC236}">
+                <a16:creationId xmlns:a16="http://schemas.microsoft.com/office/drawing/2014/main" id="{44B37126-2BD3-485B-8885-AB4143F9DD02}"/>
+              </a:ext>
+            </a:extLst>
+          </p:cNvPr>
+          <p:cNvGraphicFramePr>
+            <a:graphicFrameLocks noGrp="1"/>
+          </p:cNvGraphicFramePr>
+          <p:nvPr>
+            <p:extLst>
+              <p:ext uri="{D42A27DB-BD31-4B8C-83A1-F6EECF244321}">
+                <p14:modId xmlns:p14="http://schemas.microsoft.com/office/powerpoint/2010/main" val="2640853413"/>
+              </p:ext>
+            </p:extLst>
+          </p:nvPr>
+        </p:nvGraphicFramePr>
+        <p:xfrm>
+          <a:off x="2445079" y="757460"/>
+          <a:ext cx="7301838" cy="741680"/>
+        </p:xfrm>
+        <a:graphic>
+          <a:graphicData uri="http://schemas.openxmlformats.org/drawingml/2006/table">
+            <a:tbl>
+              <a:tblPr firstRow="1" bandRow="1">
+                <a:tableStyleId>{C083E6E3-FA7D-4D7B-A595-EF9225AFEA82}</a:tableStyleId>
+              </a:tblPr>
+              <a:tblGrid>
+                <a:gridCol w="3240000">
+                  <a:extLst>
+                    <a:ext uri="{9D8B030D-6E8A-4147-A177-3AD203B41FA5}">
+                      <a16:colId xmlns:a16="http://schemas.microsoft.com/office/drawing/2014/main" val="1730557754"/>
+                    </a:ext>
+                  </a:extLst>
+                </a:gridCol>
+                <a:gridCol w="2029838">
+                  <a:extLst>
+                    <a:ext uri="{9D8B030D-6E8A-4147-A177-3AD203B41FA5}">
+                      <a16:colId xmlns:a16="http://schemas.microsoft.com/office/drawing/2014/main" val="1207819439"/>
+                    </a:ext>
+                  </a:extLst>
+                </a:gridCol>
+                <a:gridCol w="2032000">
+                  <a:extLst>
+                    <a:ext uri="{9D8B030D-6E8A-4147-A177-3AD203B41FA5}">
+                      <a16:colId xmlns:a16="http://schemas.microsoft.com/office/drawing/2014/main" val="3675628301"/>
+                    </a:ext>
+                  </a:extLst>
+                </a:gridCol>
+              </a:tblGrid>
+              <a:tr h="370840">
+                <a:tc>
+                  <a:txBody>
+                    <a:bodyPr/>
+                    <a:lstStyle/>
+                    <a:p>
+                      <a:r>
+                        <a:rPr lang="en-US" altLang="zh-CN" dirty="0">
+                          <a:latin typeface="Calibri" panose="020F0502020204030204" pitchFamily="34" charset="0"/>
+                          <a:cs typeface="Calibri" panose="020F0502020204030204" pitchFamily="34" charset="0"/>
+                        </a:rPr>
+                        <a:t>DOI</a:t>
+                      </a:r>
+                      <a:endParaRPr lang="zh-CN" altLang="en-US" dirty="0">
+                        <a:latin typeface="Calibri" panose="020F0502020204030204" pitchFamily="34" charset="0"/>
+                        <a:cs typeface="Calibri" panose="020F0502020204030204" pitchFamily="34" charset="0"/>
+                      </a:endParaRPr>
+                    </a:p>
+                  </a:txBody>
+                  <a:tcPr/>
+                </a:tc>
+                <a:tc>
+                  <a:txBody>
+                    <a:bodyPr/>
+                    <a:lstStyle/>
+                    <a:p>
+                      <a:r>
+                        <a:rPr lang="en-US" altLang="zh-CN" dirty="0">
+                          <a:latin typeface="Calibri" panose="020F0502020204030204" pitchFamily="34" charset="0"/>
+                          <a:cs typeface="Calibri" panose="020F0502020204030204" pitchFamily="34" charset="0"/>
+                        </a:rPr>
+                        <a:t>POI</a:t>
+                      </a:r>
+                      <a:endParaRPr lang="zh-CN" altLang="en-US" dirty="0">
+                        <a:latin typeface="Calibri" panose="020F0502020204030204" pitchFamily="34" charset="0"/>
+                        <a:cs typeface="Calibri" panose="020F0502020204030204" pitchFamily="34" charset="0"/>
+                      </a:endParaRPr>
+                    </a:p>
+                  </a:txBody>
+                  <a:tcPr/>
+                </a:tc>
+                <a:tc>
+                  <a:txBody>
+                    <a:bodyPr/>
+                    <a:lstStyle/>
+                    <a:p>
+                      <a:r>
+                        <a:rPr lang="en-US" altLang="zh-CN" dirty="0">
+                          <a:latin typeface="Calibri" panose="020F0502020204030204" pitchFamily="34" charset="0"/>
+                          <a:cs typeface="Calibri" panose="020F0502020204030204" pitchFamily="34" charset="0"/>
+                        </a:rPr>
+                        <a:t>RANK</a:t>
+                      </a:r>
+                      <a:endParaRPr lang="zh-CN" altLang="en-US" dirty="0">
+                        <a:latin typeface="Calibri" panose="020F0502020204030204" pitchFamily="34" charset="0"/>
+                        <a:cs typeface="Calibri" panose="020F0502020204030204" pitchFamily="34" charset="0"/>
+                      </a:endParaRPr>
+                    </a:p>
+                  </a:txBody>
+                  <a:tcPr/>
+                </a:tc>
+                <a:extLst>
+                  <a:ext uri="{0D108BD9-81ED-4DB2-BD59-A6C34878D82A}">
+                    <a16:rowId xmlns:a16="http://schemas.microsoft.com/office/drawing/2014/main" val="1875668321"/>
+                  </a:ext>
+                </a:extLst>
+              </a:tr>
+              <a:tr h="370840">
+                <a:tc>
+                  <a:txBody>
+                    <a:bodyPr/>
+                    <a:lstStyle/>
+                    <a:p>
+                      <a:r>
+                        <a:rPr lang="en-US" altLang="zh-CN" dirty="0">
+                          <a:latin typeface="Calibri" panose="020F0502020204030204" pitchFamily="34" charset="0"/>
+                          <a:cs typeface="Calibri" panose="020F0502020204030204" pitchFamily="34" charset="0"/>
+                        </a:rPr>
+                        <a:t>10.1002/cmdc.201500103</a:t>
+                      </a:r>
+                      <a:endParaRPr lang="zh-CN" altLang="en-US" dirty="0">
+                        <a:latin typeface="Calibri" panose="020F0502020204030204" pitchFamily="34" charset="0"/>
+                        <a:cs typeface="Calibri" panose="020F0502020204030204" pitchFamily="34" charset="0"/>
+                      </a:endParaRPr>
+                    </a:p>
+                  </a:txBody>
+                  <a:tcPr/>
+                </a:tc>
+                <a:tc>
+                  <a:txBody>
+                    <a:bodyPr/>
+                    <a:lstStyle/>
+                    <a:p>
+                      <a:r>
+                        <a:rPr lang="en-US" altLang="zh-CN" dirty="0" err="1">
+                          <a:latin typeface="Calibri" panose="020F0502020204030204" pitchFamily="34" charset="0"/>
+                          <a:cs typeface="Calibri" panose="020F0502020204030204" pitchFamily="34" charset="0"/>
+                        </a:rPr>
+                        <a:t>furin</a:t>
+                      </a:r>
+                      <a:endParaRPr lang="zh-CN" altLang="en-US" dirty="0">
+                        <a:latin typeface="Calibri" panose="020F0502020204030204" pitchFamily="34" charset="0"/>
+                        <a:cs typeface="Calibri" panose="020F0502020204030204" pitchFamily="34" charset="0"/>
+                      </a:endParaRPr>
+                    </a:p>
+                  </a:txBody>
+                  <a:tcPr/>
+                </a:tc>
+                <a:tc>
+                  <a:txBody>
+                    <a:bodyPr/>
+                    <a:lstStyle/>
+                    <a:p>
+                      <a:r>
+                        <a:rPr lang="en-US" altLang="zh-CN" dirty="0">
+                          <a:latin typeface="Calibri" panose="020F0502020204030204" pitchFamily="34" charset="0"/>
+                          <a:cs typeface="Calibri" panose="020F0502020204030204" pitchFamily="34" charset="0"/>
+                        </a:rPr>
+                        <a:t>4</a:t>
+                      </a:r>
+                      <a:endParaRPr lang="zh-CN" altLang="en-US" dirty="0">
+                        <a:latin typeface="Calibri" panose="020F0502020204030204" pitchFamily="34" charset="0"/>
+                        <a:cs typeface="Calibri" panose="020F0502020204030204" pitchFamily="34" charset="0"/>
+                      </a:endParaRPr>
+                    </a:p>
+                  </a:txBody>
+                  <a:tcPr/>
+                </a:tc>
+                <a:extLst>
+                  <a:ext uri="{0D108BD9-81ED-4DB2-BD59-A6C34878D82A}">
+                    <a16:rowId xmlns:a16="http://schemas.microsoft.com/office/drawing/2014/main" val="3942900020"/>
+                  </a:ext>
+                </a:extLst>
+              </a:tr>
+            </a:tbl>
+          </a:graphicData>
+        </a:graphic>
+      </p:graphicFrame>
+      <p:sp>
+        <p:nvSpPr>
+          <p:cNvPr id="13" name="文本框 12">
+            <a:extLst>
+              <a:ext uri="{FF2B5EF4-FFF2-40B4-BE49-F238E27FC236}">
+                <a16:creationId xmlns:a16="http://schemas.microsoft.com/office/drawing/2014/main" id="{1C430567-FB19-4B05-8A46-57292461E5E6}"/>
+              </a:ext>
+            </a:extLst>
+          </p:cNvPr>
+          <p:cNvSpPr txBox="1"/>
+          <p:nvPr/>
+        </p:nvSpPr>
+        <p:spPr>
+          <a:xfrm>
+            <a:off x="2258437" y="4900210"/>
+            <a:ext cx="7675125" cy="923330"/>
+          </a:xfrm>
+          <a:prstGeom prst="rect">
+            <a:avLst/>
+          </a:prstGeom>
+          <a:noFill/>
+        </p:spPr>
+        <p:txBody>
+          <a:bodyPr wrap="square" rtlCol="0">
+            <a:spAutoFit/>
+          </a:bodyPr>
+          <a:lstStyle/>
+          <a:p>
+            <a:r>
+              <a:rPr lang="en-US" altLang="zh-CN" dirty="0">
+                <a:latin typeface="Calibri" panose="020F0502020204030204" pitchFamily="34" charset="0"/>
+                <a:cs typeface="Calibri" panose="020F0502020204030204" pitchFamily="34" charset="0"/>
+              </a:rPr>
+              <a:t>Notes: </a:t>
+            </a:r>
+          </a:p>
+          <a:p>
+            <a:pPr marL="285750" indent="-285750">
+              <a:buFont typeface="Wingdings" panose="05000000000000000000" pitchFamily="2" charset="2"/>
+              <a:buChar char="ü"/>
+            </a:pPr>
+            <a:r>
+              <a:rPr lang="en-US" altLang="zh-CN" dirty="0">
+                <a:latin typeface="Calibri" panose="020F0502020204030204" pitchFamily="34" charset="0"/>
+                <a:cs typeface="Calibri" panose="020F0502020204030204" pitchFamily="34" charset="0"/>
+              </a:rPr>
+              <a:t>Thorough data</a:t>
+            </a:r>
+          </a:p>
+          <a:p>
+            <a:pPr marL="285750" indent="-285750">
+              <a:buFont typeface="Arial" panose="020B0604020202020204" pitchFamily="34" charset="0"/>
+              <a:buChar char="•"/>
+            </a:pPr>
+            <a:r>
+              <a:rPr lang="en-US" altLang="zh-CN" dirty="0" err="1">
+                <a:latin typeface="Calibri" panose="020F0502020204030204" pitchFamily="34" charset="0"/>
+                <a:cs typeface="Calibri" panose="020F0502020204030204" pitchFamily="34" charset="0"/>
+              </a:rPr>
+              <a:t>Phac</a:t>
+            </a:r>
+            <a:r>
+              <a:rPr lang="en-US" altLang="zh-CN" dirty="0">
+                <a:latin typeface="Calibri" panose="020F0502020204030204" pitchFamily="34" charset="0"/>
+                <a:cs typeface="Calibri" panose="020F0502020204030204" pitchFamily="34" charset="0"/>
+              </a:rPr>
+              <a:t>/Amba group at N/C terminal as the scaffold of </a:t>
+            </a:r>
+            <a:r>
+              <a:rPr lang="en-US" altLang="zh-CN" dirty="0" err="1">
+                <a:latin typeface="Calibri" panose="020F0502020204030204" pitchFamily="34" charset="0"/>
+                <a:cs typeface="Calibri" panose="020F0502020204030204" pitchFamily="34" charset="0"/>
+              </a:rPr>
+              <a:t>furin</a:t>
+            </a:r>
+            <a:r>
+              <a:rPr lang="en-US" altLang="zh-CN" dirty="0">
+                <a:latin typeface="Calibri" panose="020F0502020204030204" pitchFamily="34" charset="0"/>
+                <a:cs typeface="Calibri" panose="020F0502020204030204" pitchFamily="34" charset="0"/>
+              </a:rPr>
+              <a:t> inhibitor </a:t>
+            </a:r>
+          </a:p>
+        </p:txBody>
+      </p:sp>
+      <p:cxnSp>
+        <p:nvCxnSpPr>
+          <p:cNvPr id="17" name="直接箭头连接符 16">
+            <a:extLst>
+              <a:ext uri="{FF2B5EF4-FFF2-40B4-BE49-F238E27FC236}">
+                <a16:creationId xmlns:a16="http://schemas.microsoft.com/office/drawing/2014/main" id="{1287C2DF-C291-46CC-8921-1C175B90EC59}"/>
+              </a:ext>
+            </a:extLst>
+          </p:cNvPr>
+          <p:cNvCxnSpPr/>
+          <p:nvPr/>
+        </p:nvCxnSpPr>
+        <p:spPr>
+          <a:xfrm>
+            <a:off x="5893187" y="3052610"/>
+            <a:ext cx="202811" cy="0"/>
+          </a:xfrm>
+          <a:prstGeom prst="straightConnector1">
+            <a:avLst/>
+          </a:prstGeom>
+          <a:ln>
+            <a:solidFill>
+              <a:srgbClr val="FF0000"/>
+            </a:solidFill>
+            <a:tailEnd type="triangle"/>
+          </a:ln>
+        </p:spPr>
+        <p:style>
+          <a:lnRef idx="1">
+            <a:schemeClr val="accent1"/>
+          </a:lnRef>
+          <a:fillRef idx="0">
+            <a:schemeClr val="accent1"/>
+          </a:fillRef>
+          <a:effectRef idx="0">
+            <a:schemeClr val="accent1"/>
+          </a:effectRef>
+          <a:fontRef idx="minor">
+            <a:schemeClr val="tx1"/>
+          </a:fontRef>
+        </p:style>
+      </p:cxnSp>
+      <p:sp>
+        <p:nvSpPr>
+          <p:cNvPr id="10" name="矩形 9">
+            <a:extLst>
+              <a:ext uri="{FF2B5EF4-FFF2-40B4-BE49-F238E27FC236}">
+                <a16:creationId xmlns:a16="http://schemas.microsoft.com/office/drawing/2014/main" id="{05749525-163A-498D-9490-F0593E0B3262}"/>
+              </a:ext>
+            </a:extLst>
+          </p:cNvPr>
+          <p:cNvSpPr/>
+          <p:nvPr/>
+        </p:nvSpPr>
+        <p:spPr>
+          <a:xfrm>
+            <a:off x="5033035" y="2821021"/>
+            <a:ext cx="365225" cy="607979"/>
+          </a:xfrm>
+          <a:prstGeom prst="rect">
+            <a:avLst/>
+          </a:prstGeom>
+          <a:noFill/>
+          <a:ln w="15875">
+            <a:solidFill>
+              <a:schemeClr val="accent6">
+                <a:lumMod val="60000"/>
+                <a:lumOff val="40000"/>
+              </a:schemeClr>
+            </a:solidFill>
+            <a:prstDash val="dash"/>
+          </a:ln>
+        </p:spPr>
+        <p:style>
+          <a:lnRef idx="2">
+            <a:schemeClr val="accent1">
+              <a:shade val="50000"/>
+            </a:schemeClr>
+          </a:lnRef>
+          <a:fillRef idx="1">
+            <a:schemeClr val="accent1"/>
+          </a:fillRef>
+          <a:effectRef idx="0">
+            <a:schemeClr val="accent1"/>
+          </a:effectRef>
+          <a:fontRef idx="minor">
+            <a:schemeClr val="lt1"/>
+          </a:fontRef>
+        </p:style>
+        <p:txBody>
+          <a:bodyPr rtlCol="0" anchor="ctr"/>
+          <a:lstStyle/>
+          <a:p>
+            <a:pPr algn="ctr"/>
+            <a:endParaRPr lang="zh-CN" altLang="en-US"/>
+          </a:p>
+        </p:txBody>
+      </p:sp>
+    </p:spTree>
+    <p:extLst>
+      <p:ext uri="{BB962C8B-B14F-4D97-AF65-F5344CB8AC3E}">
+        <p14:creationId xmlns:p14="http://schemas.microsoft.com/office/powerpoint/2010/main" val="74691055"/>
+      </p:ext>
+    </p:extLst>
+  </p:cSld>
+  <p:clrMapOvr>
+    <a:masterClrMapping/>
+  </p:clrMapOvr>
+</p:sld>
+</file>
+
+<file path=ppt/slides/slide8.xml><?xml version="1.0" encoding="utf-8"?>
+<p:sld xmlns:a="http://schemas.openxmlformats.org/drawingml/2006/main" xmlns:r="http://schemas.openxmlformats.org/officeDocument/2006/relationships" xmlns:p="http://schemas.openxmlformats.org/presentationml/2006/main">
+  <p:cSld>
+    <p:spTree>
+      <p:nvGrpSpPr>
+        <p:cNvPr id="1" name=""/>
+        <p:cNvGrpSpPr/>
+        <p:nvPr/>
+      </p:nvGrpSpPr>
+      <p:grpSpPr>
+        <a:xfrm>
+          <a:off x="0" y="0"/>
+          <a:ext cx="0" cy="0"/>
+          <a:chOff x="0" y="0"/>
+          <a:chExt cx="0" cy="0"/>
+        </a:xfrm>
+      </p:grpSpPr>
+      <p:graphicFrame>
+        <p:nvGraphicFramePr>
+          <p:cNvPr id="5" name="表格 4">
+            <a:extLst>
+              <a:ext uri="{FF2B5EF4-FFF2-40B4-BE49-F238E27FC236}">
+                <a16:creationId xmlns:a16="http://schemas.microsoft.com/office/drawing/2014/main" id="{44B37126-2BD3-485B-8885-AB4143F9DD02}"/>
+              </a:ext>
+            </a:extLst>
+          </p:cNvPr>
+          <p:cNvGraphicFramePr>
+            <a:graphicFrameLocks noGrp="1"/>
+          </p:cNvGraphicFramePr>
+          <p:nvPr>
+            <p:extLst>
+              <p:ext uri="{D42A27DB-BD31-4B8C-83A1-F6EECF244321}">
+                <p14:modId xmlns:p14="http://schemas.microsoft.com/office/powerpoint/2010/main" val="511420936"/>
+              </p:ext>
+            </p:extLst>
+          </p:nvPr>
+        </p:nvGraphicFramePr>
+        <p:xfrm>
+          <a:off x="2445079" y="757460"/>
+          <a:ext cx="7301838" cy="741680"/>
+        </p:xfrm>
+        <a:graphic>
+          <a:graphicData uri="http://schemas.openxmlformats.org/drawingml/2006/table">
+            <a:tbl>
+              <a:tblPr firstRow="1" bandRow="1">
+                <a:tableStyleId>{C083E6E3-FA7D-4D7B-A595-EF9225AFEA82}</a:tableStyleId>
+              </a:tblPr>
+              <a:tblGrid>
+                <a:gridCol w="3240000">
+                  <a:extLst>
+                    <a:ext uri="{9D8B030D-6E8A-4147-A177-3AD203B41FA5}">
+                      <a16:colId xmlns:a16="http://schemas.microsoft.com/office/drawing/2014/main" val="1730557754"/>
+                    </a:ext>
+                  </a:extLst>
+                </a:gridCol>
+                <a:gridCol w="2029838">
+                  <a:extLst>
+                    <a:ext uri="{9D8B030D-6E8A-4147-A177-3AD203B41FA5}">
+                      <a16:colId xmlns:a16="http://schemas.microsoft.com/office/drawing/2014/main" val="1207819439"/>
+                    </a:ext>
+                  </a:extLst>
+                </a:gridCol>
+                <a:gridCol w="2032000">
+                  <a:extLst>
+                    <a:ext uri="{9D8B030D-6E8A-4147-A177-3AD203B41FA5}">
+                      <a16:colId xmlns:a16="http://schemas.microsoft.com/office/drawing/2014/main" val="3675628301"/>
+                    </a:ext>
+                  </a:extLst>
+                </a:gridCol>
+              </a:tblGrid>
+              <a:tr h="370840">
+                <a:tc>
+                  <a:txBody>
+                    <a:bodyPr/>
+                    <a:lstStyle/>
+                    <a:p>
+                      <a:r>
+                        <a:rPr lang="en-US" altLang="zh-CN" dirty="0">
+                          <a:latin typeface="Calibri" panose="020F0502020204030204" pitchFamily="34" charset="0"/>
+                          <a:cs typeface="Calibri" panose="020F0502020204030204" pitchFamily="34" charset="0"/>
+                        </a:rPr>
+                        <a:t>DOI</a:t>
+                      </a:r>
+                      <a:endParaRPr lang="zh-CN" altLang="en-US" dirty="0">
+                        <a:latin typeface="Calibri" panose="020F0502020204030204" pitchFamily="34" charset="0"/>
+                        <a:cs typeface="Calibri" panose="020F0502020204030204" pitchFamily="34" charset="0"/>
+                      </a:endParaRPr>
+                    </a:p>
+                  </a:txBody>
+                  <a:tcPr/>
+                </a:tc>
+                <a:tc>
+                  <a:txBody>
+                    <a:bodyPr/>
+                    <a:lstStyle/>
+                    <a:p>
+                      <a:r>
+                        <a:rPr lang="en-US" altLang="zh-CN" dirty="0">
+                          <a:latin typeface="Calibri" panose="020F0502020204030204" pitchFamily="34" charset="0"/>
+                          <a:cs typeface="Calibri" panose="020F0502020204030204" pitchFamily="34" charset="0"/>
+                        </a:rPr>
+                        <a:t>POI</a:t>
+                      </a:r>
+                      <a:endParaRPr lang="zh-CN" altLang="en-US" dirty="0">
+                        <a:latin typeface="Calibri" panose="020F0502020204030204" pitchFamily="34" charset="0"/>
+                        <a:cs typeface="Calibri" panose="020F0502020204030204" pitchFamily="34" charset="0"/>
+                      </a:endParaRPr>
+                    </a:p>
+                  </a:txBody>
+                  <a:tcPr/>
+                </a:tc>
+                <a:tc>
+                  <a:txBody>
+                    <a:bodyPr/>
+                    <a:lstStyle/>
+                    <a:p>
+                      <a:r>
+                        <a:rPr lang="en-US" altLang="zh-CN" dirty="0">
+                          <a:latin typeface="Calibri" panose="020F0502020204030204" pitchFamily="34" charset="0"/>
+                          <a:cs typeface="Calibri" panose="020F0502020204030204" pitchFamily="34" charset="0"/>
+                        </a:rPr>
+                        <a:t>RANK</a:t>
+                      </a:r>
+                      <a:endParaRPr lang="zh-CN" altLang="en-US" dirty="0">
+                        <a:latin typeface="Calibri" panose="020F0502020204030204" pitchFamily="34" charset="0"/>
+                        <a:cs typeface="Calibri" panose="020F0502020204030204" pitchFamily="34" charset="0"/>
+                      </a:endParaRPr>
+                    </a:p>
+                  </a:txBody>
+                  <a:tcPr/>
+                </a:tc>
+                <a:extLst>
+                  <a:ext uri="{0D108BD9-81ED-4DB2-BD59-A6C34878D82A}">
+                    <a16:rowId xmlns:a16="http://schemas.microsoft.com/office/drawing/2014/main" val="1875668321"/>
+                  </a:ext>
+                </a:extLst>
+              </a:tr>
+              <a:tr h="370840">
+                <a:tc>
+                  <a:txBody>
+                    <a:bodyPr/>
+                    <a:lstStyle/>
+                    <a:p>
+                      <a:r>
+                        <a:rPr lang="en-US" altLang="zh-CN" dirty="0">
+                          <a:latin typeface="Calibri" panose="020F0502020204030204" pitchFamily="34" charset="0"/>
+                          <a:cs typeface="Calibri" panose="020F0502020204030204" pitchFamily="34" charset="0"/>
+                        </a:rPr>
+                        <a:t>10.1371/journal.pone.0032637</a:t>
+                      </a:r>
+                      <a:endParaRPr lang="zh-CN" altLang="en-US" dirty="0">
+                        <a:latin typeface="Calibri" panose="020F0502020204030204" pitchFamily="34" charset="0"/>
+                        <a:cs typeface="Calibri" panose="020F0502020204030204" pitchFamily="34" charset="0"/>
+                      </a:endParaRPr>
+                    </a:p>
+                  </a:txBody>
+                  <a:tcPr/>
+                </a:tc>
+                <a:tc>
+                  <a:txBody>
+                    <a:bodyPr/>
+                    <a:lstStyle/>
+                    <a:p>
+                      <a:r>
+                        <a:rPr lang="en-US" altLang="zh-CN" dirty="0">
+                          <a:latin typeface="Calibri" panose="020F0502020204030204" pitchFamily="34" charset="0"/>
+                          <a:cs typeface="Calibri" panose="020F0502020204030204" pitchFamily="34" charset="0"/>
+                        </a:rPr>
+                        <a:t>calpain</a:t>
+                      </a:r>
+                      <a:endParaRPr lang="zh-CN" altLang="en-US" dirty="0">
+                        <a:latin typeface="Calibri" panose="020F0502020204030204" pitchFamily="34" charset="0"/>
+                        <a:cs typeface="Calibri" panose="020F0502020204030204" pitchFamily="34" charset="0"/>
+                      </a:endParaRPr>
+                    </a:p>
+                  </a:txBody>
+                  <a:tcPr/>
+                </a:tc>
+                <a:tc>
+                  <a:txBody>
+                    <a:bodyPr/>
+                    <a:lstStyle/>
+                    <a:p>
+                      <a:r>
+                        <a:rPr lang="en-US" altLang="zh-CN" dirty="0">
+                          <a:latin typeface="Calibri" panose="020F0502020204030204" pitchFamily="34" charset="0"/>
+                          <a:cs typeface="Calibri" panose="020F0502020204030204" pitchFamily="34" charset="0"/>
+                        </a:rPr>
+                        <a:t>2</a:t>
+                      </a:r>
+                      <a:endParaRPr lang="zh-CN" altLang="en-US" dirty="0">
+                        <a:latin typeface="Calibri" panose="020F0502020204030204" pitchFamily="34" charset="0"/>
+                        <a:cs typeface="Calibri" panose="020F0502020204030204" pitchFamily="34" charset="0"/>
+                      </a:endParaRPr>
+                    </a:p>
+                  </a:txBody>
+                  <a:tcPr/>
+                </a:tc>
+                <a:extLst>
+                  <a:ext uri="{0D108BD9-81ED-4DB2-BD59-A6C34878D82A}">
+                    <a16:rowId xmlns:a16="http://schemas.microsoft.com/office/drawing/2014/main" val="3942900020"/>
+                  </a:ext>
+                </a:extLst>
+              </a:tr>
+            </a:tbl>
+          </a:graphicData>
+        </a:graphic>
+      </p:graphicFrame>
+      <p:sp>
+        <p:nvSpPr>
+          <p:cNvPr id="13" name="文本框 12">
+            <a:extLst>
+              <a:ext uri="{FF2B5EF4-FFF2-40B4-BE49-F238E27FC236}">
+                <a16:creationId xmlns:a16="http://schemas.microsoft.com/office/drawing/2014/main" id="{1C430567-FB19-4B05-8A46-57292461E5E6}"/>
+              </a:ext>
+            </a:extLst>
+          </p:cNvPr>
+          <p:cNvSpPr txBox="1"/>
+          <p:nvPr/>
+        </p:nvSpPr>
+        <p:spPr>
+          <a:xfrm>
+            <a:off x="2258437" y="4900210"/>
+            <a:ext cx="7675125" cy="923330"/>
+          </a:xfrm>
+          <a:prstGeom prst="rect">
+            <a:avLst/>
+          </a:prstGeom>
+          <a:noFill/>
+        </p:spPr>
+        <p:txBody>
+          <a:bodyPr wrap="square" rtlCol="0">
+            <a:spAutoFit/>
+          </a:bodyPr>
+          <a:lstStyle/>
+          <a:p>
+            <a:r>
+              <a:rPr lang="en-US" altLang="zh-CN" dirty="0">
+                <a:latin typeface="Calibri" panose="020F0502020204030204" pitchFamily="34" charset="0"/>
+                <a:cs typeface="Calibri" panose="020F0502020204030204" pitchFamily="34" charset="0"/>
+              </a:rPr>
+              <a:t>Notes: </a:t>
+            </a:r>
+          </a:p>
+          <a:p>
+            <a:pPr marL="285750" indent="-285750">
+              <a:buFont typeface="Wingdings" panose="05000000000000000000" pitchFamily="2" charset="2"/>
+              <a:buChar char="ü"/>
+            </a:pPr>
+            <a:r>
+              <a:rPr lang="en-US" altLang="zh-CN" dirty="0">
+                <a:latin typeface="Calibri" panose="020F0502020204030204" pitchFamily="34" charset="0"/>
+                <a:cs typeface="Calibri" panose="020F0502020204030204" pitchFamily="34" charset="0"/>
+              </a:rPr>
+              <a:t>Rational design by </a:t>
+            </a:r>
+            <a:r>
+              <a:rPr lang="en-US" altLang="zh-CN" dirty="0" err="1">
+                <a:latin typeface="Calibri" panose="020F0502020204030204" pitchFamily="34" charset="0"/>
+                <a:cs typeface="Calibri" panose="020F0502020204030204" pitchFamily="34" charset="0"/>
+              </a:rPr>
+              <a:t>rosetta</a:t>
+            </a:r>
+            <a:endParaRPr lang="en-US" altLang="zh-CN" dirty="0">
+              <a:latin typeface="Calibri" panose="020F0502020204030204" pitchFamily="34" charset="0"/>
+              <a:cs typeface="Calibri" panose="020F0502020204030204" pitchFamily="34" charset="0"/>
+            </a:endParaRPr>
+          </a:p>
+          <a:p>
+            <a:pPr marL="285750" indent="-285750">
+              <a:buFont typeface="Arial" panose="020B0604020202020204" pitchFamily="34" charset="0"/>
+              <a:buChar char="•"/>
+            </a:pPr>
+            <a:r>
+              <a:rPr lang="en-US" altLang="zh-CN" dirty="0">
+                <a:latin typeface="Calibri" panose="020F0502020204030204" pitchFamily="34" charset="0"/>
+                <a:cs typeface="Calibri" panose="020F0502020204030204" pitchFamily="34" charset="0"/>
+              </a:rPr>
+              <a:t>No peptide-protein complex in </a:t>
+            </a:r>
+            <a:r>
+              <a:rPr lang="en-US" altLang="zh-CN" dirty="0" err="1">
+                <a:latin typeface="Calibri" panose="020F0502020204030204" pitchFamily="34" charset="0"/>
+                <a:cs typeface="Calibri" panose="020F0502020204030204" pitchFamily="34" charset="0"/>
+              </a:rPr>
+              <a:t>pdb</a:t>
+            </a:r>
+            <a:endParaRPr lang="en-US" altLang="zh-CN" dirty="0">
+              <a:latin typeface="Calibri" panose="020F0502020204030204" pitchFamily="34" charset="0"/>
+              <a:cs typeface="Calibri" panose="020F0502020204030204" pitchFamily="34" charset="0"/>
+            </a:endParaRPr>
+          </a:p>
+        </p:txBody>
+      </p:sp>
+      <p:pic>
+        <p:nvPicPr>
+          <p:cNvPr id="2" name="图片 1">
+            <a:extLst>
+              <a:ext uri="{FF2B5EF4-FFF2-40B4-BE49-F238E27FC236}">
+                <a16:creationId xmlns:a16="http://schemas.microsoft.com/office/drawing/2014/main" id="{65869722-4583-41FE-B50E-104F3AFF4C09}"/>
+              </a:ext>
+            </a:extLst>
+          </p:cNvPr>
+          <p:cNvPicPr>
+            <a:picLocks noChangeAspect="1"/>
+          </p:cNvPicPr>
+          <p:nvPr/>
+        </p:nvPicPr>
+        <p:blipFill>
+          <a:blip r:embed="rId3"/>
+          <a:stretch>
+            <a:fillRect/>
+          </a:stretch>
+        </p:blipFill>
+        <p:spPr>
+          <a:xfrm>
+            <a:off x="1897013" y="1683137"/>
+            <a:ext cx="8397970" cy="3033075"/>
+          </a:xfrm>
+          <a:prstGeom prst="rect">
+            <a:avLst/>
+          </a:prstGeom>
+        </p:spPr>
+      </p:pic>
+    </p:spTree>
+    <p:extLst>
+      <p:ext uri="{BB962C8B-B14F-4D97-AF65-F5344CB8AC3E}">
+        <p14:creationId xmlns:p14="http://schemas.microsoft.com/office/powerpoint/2010/main" val="4117623973"/>
       </p:ext>
     </p:extLst>
   </p:cSld>

</xml_diff>